<commit_message>
Completed outline for review
</commit_message>
<xml_diff>
--- a/rest-api-http-foundations.pptx
+++ b/rest-api-http-foundations.pptx
@@ -5,27 +5,30 @@
     <p:sldMasterId id="2147483660" r:id="rId1"/>
   </p:sldMasterIdLst>
   <p:notesMasterIdLst>
-    <p:notesMasterId r:id="rId20"/>
+    <p:notesMasterId r:id="rId23"/>
   </p:notesMasterIdLst>
   <p:sldIdLst>
     <p:sldId id="256" r:id="rId2"/>
     <p:sldId id="276" r:id="rId3"/>
     <p:sldId id="277" r:id="rId4"/>
     <p:sldId id="272" r:id="rId5"/>
-    <p:sldId id="257" r:id="rId6"/>
-    <p:sldId id="270" r:id="rId7"/>
-    <p:sldId id="278" r:id="rId8"/>
-    <p:sldId id="327" r:id="rId9"/>
-    <p:sldId id="322" r:id="rId10"/>
-    <p:sldId id="328" r:id="rId11"/>
-    <p:sldId id="323" r:id="rId12"/>
-    <p:sldId id="326" r:id="rId13"/>
-    <p:sldId id="324" r:id="rId14"/>
-    <p:sldId id="311" r:id="rId15"/>
-    <p:sldId id="325" r:id="rId16"/>
-    <p:sldId id="321" r:id="rId17"/>
-    <p:sldId id="279" r:id="rId18"/>
-    <p:sldId id="280" r:id="rId19"/>
+    <p:sldId id="278" r:id="rId6"/>
+    <p:sldId id="257" r:id="rId7"/>
+    <p:sldId id="327" r:id="rId8"/>
+    <p:sldId id="331" r:id="rId9"/>
+    <p:sldId id="270" r:id="rId10"/>
+    <p:sldId id="332" r:id="rId11"/>
+    <p:sldId id="326" r:id="rId12"/>
+    <p:sldId id="322" r:id="rId13"/>
+    <p:sldId id="329" r:id="rId14"/>
+    <p:sldId id="330" r:id="rId15"/>
+    <p:sldId id="328" r:id="rId16"/>
+    <p:sldId id="333" r:id="rId17"/>
+    <p:sldId id="334" r:id="rId18"/>
+    <p:sldId id="335" r:id="rId19"/>
+    <p:sldId id="311" r:id="rId20"/>
+    <p:sldId id="321" r:id="rId21"/>
+    <p:sldId id="280" r:id="rId22"/>
   </p:sldIdLst>
   <p:sldSz cx="12192000" cy="6858000"/>
   <p:notesSz cx="6858000" cy="9144000"/>
@@ -225,7 +228,7 @@
           <a:p>
             <a:fld id="{966F6F5D-167E-1849-B841-EB0817BB385A}" type="datetimeFigureOut">
               <a:rPr lang="en-US" smtClean="0"/>
-              <a:t>3/10/20</a:t>
+              <a:t>3/18/20</a:t>
             </a:fld>
             <a:endParaRPr lang="en-US"/>
           </a:p>
@@ -681,7 +684,7 @@
           <a:p>
             <a:fld id="{020CF8D1-BA82-5045-ACF9-1AA42AD6A519}" type="slidenum">
               <a:rPr lang="en-US" smtClean="0"/>
-              <a:t>13</a:t>
+              <a:t>14</a:t>
             </a:fld>
             <a:endParaRPr lang="en-US"/>
           </a:p>
@@ -690,7 +693,7 @@
     </p:spTree>
     <p:extLst>
       <p:ext uri="{BB962C8B-B14F-4D97-AF65-F5344CB8AC3E}">
-        <p14:creationId xmlns:p14="http://schemas.microsoft.com/office/powerpoint/2010/main" val="986027928"/>
+        <p14:creationId xmlns:p14="http://schemas.microsoft.com/office/powerpoint/2010/main" val="3481472389"/>
       </p:ext>
     </p:extLst>
   </p:cSld>
@@ -785,7 +788,7 @@
           <a:p>
             <a:fld id="{020CF8D1-BA82-5045-ACF9-1AA42AD6A519}" type="slidenum">
               <a:rPr lang="en-US" smtClean="0"/>
-              <a:t>17</a:t>
+              <a:t>16</a:t>
             </a:fld>
             <a:endParaRPr lang="en-US"/>
           </a:p>
@@ -794,7 +797,111 @@
     </p:spTree>
     <p:extLst>
       <p:ext uri="{BB962C8B-B14F-4D97-AF65-F5344CB8AC3E}">
-        <p14:creationId xmlns:p14="http://schemas.microsoft.com/office/powerpoint/2010/main" val="4194303824"/>
+        <p14:creationId xmlns:p14="http://schemas.microsoft.com/office/powerpoint/2010/main" val="3252389655"/>
+      </p:ext>
+    </p:extLst>
+  </p:cSld>
+  <p:clrMapOvr>
+    <a:masterClrMapping/>
+  </p:clrMapOvr>
+</p:notes>
+</file>
+
+<file path=ppt/notesSlides/notesSlide12.xml><?xml version="1.0" encoding="utf-8"?>
+<p:notes xmlns:a="http://schemas.openxmlformats.org/drawingml/2006/main" xmlns:r="http://schemas.openxmlformats.org/officeDocument/2006/relationships" xmlns:p="http://schemas.openxmlformats.org/presentationml/2006/main">
+  <p:cSld>
+    <p:spTree>
+      <p:nvGrpSpPr>
+        <p:cNvPr id="1" name=""/>
+        <p:cNvGrpSpPr/>
+        <p:nvPr/>
+      </p:nvGrpSpPr>
+      <p:grpSpPr>
+        <a:xfrm>
+          <a:off x="0" y="0"/>
+          <a:ext cx="0" cy="0"/>
+          <a:chOff x="0" y="0"/>
+          <a:chExt cx="0" cy="0"/>
+        </a:xfrm>
+      </p:grpSpPr>
+      <p:sp>
+        <p:nvSpPr>
+          <p:cNvPr id="2" name="Slide Image Placeholder 1"/>
+          <p:cNvSpPr>
+            <a:spLocks noGrp="1" noRot="1" noChangeAspect="1"/>
+          </p:cNvSpPr>
+          <p:nvPr>
+            <p:ph type="sldImg"/>
+          </p:nvPr>
+        </p:nvSpPr>
+        <p:spPr/>
+      </p:sp>
+      <p:sp>
+        <p:nvSpPr>
+          <p:cNvPr id="3" name="Notes Placeholder 2"/>
+          <p:cNvSpPr>
+            <a:spLocks noGrp="1"/>
+          </p:cNvSpPr>
+          <p:nvPr>
+            <p:ph type="body" idx="1"/>
+          </p:nvPr>
+        </p:nvSpPr>
+        <p:spPr/>
+        <p:txBody>
+          <a:bodyPr/>
+          <a:lstStyle/>
+          <a:p>
+            <a:pPr marL="0" marR="0" lvl="0" indent="0" algn="l" defTabSz="914400" rtl="0" eaLnBrk="1" fontAlgn="auto" latinLnBrk="0" hangingPunct="1">
+              <a:lnSpc>
+                <a:spcPct val="100000"/>
+              </a:lnSpc>
+              <a:spcBef>
+                <a:spcPts val="0"/>
+              </a:spcBef>
+              <a:spcAft>
+                <a:spcPts val="0"/>
+              </a:spcAft>
+              <a:buClrTx/>
+              <a:buSzTx/>
+              <a:buFontTx/>
+              <a:buNone/>
+              <a:tabLst/>
+              <a:defRPr/>
+            </a:pPr>
+            <a:r>
+              <a:rPr lang="en-US" dirty="0"/>
+              <a:t>// TODO</a:t>
+            </a:r>
+          </a:p>
+        </p:txBody>
+      </p:sp>
+      <p:sp>
+        <p:nvSpPr>
+          <p:cNvPr id="4" name="Slide Number Placeholder 3"/>
+          <p:cNvSpPr>
+            <a:spLocks noGrp="1"/>
+          </p:cNvSpPr>
+          <p:nvPr>
+            <p:ph type="sldNum" sz="quarter" idx="5"/>
+          </p:nvPr>
+        </p:nvSpPr>
+        <p:spPr/>
+        <p:txBody>
+          <a:bodyPr/>
+          <a:lstStyle/>
+          <a:p>
+            <a:fld id="{020CF8D1-BA82-5045-ACF9-1AA42AD6A519}" type="slidenum">
+              <a:rPr lang="en-US" smtClean="0"/>
+              <a:t>18</a:t>
+            </a:fld>
+            <a:endParaRPr lang="en-US"/>
+          </a:p>
+        </p:txBody>
+      </p:sp>
+    </p:spTree>
+    <p:extLst>
+      <p:ext uri="{BB962C8B-B14F-4D97-AF65-F5344CB8AC3E}">
+        <p14:creationId xmlns:p14="http://schemas.microsoft.com/office/powerpoint/2010/main" val="4152409612"/>
       </p:ext>
     </p:extLst>
   </p:cSld>
@@ -1193,7 +1300,7 @@
     </p:spTree>
     <p:extLst>
       <p:ext uri="{BB962C8B-B14F-4D97-AF65-F5344CB8AC3E}">
-        <p14:creationId xmlns:p14="http://schemas.microsoft.com/office/powerpoint/2010/main" val="1449554835"/>
+        <p14:creationId xmlns:p14="http://schemas.microsoft.com/office/powerpoint/2010/main" val="3139730376"/>
       </p:ext>
     </p:extLst>
   </p:cSld>
@@ -1297,7 +1404,7 @@
     </p:spTree>
     <p:extLst>
       <p:ext uri="{BB962C8B-B14F-4D97-AF65-F5344CB8AC3E}">
-        <p14:creationId xmlns:p14="http://schemas.microsoft.com/office/powerpoint/2010/main" val="520155400"/>
+        <p14:creationId xmlns:p14="http://schemas.microsoft.com/office/powerpoint/2010/main" val="1449554835"/>
       </p:ext>
     </p:extLst>
   </p:cSld>
@@ -1392,7 +1499,7 @@
           <a:p>
             <a:fld id="{020CF8D1-BA82-5045-ACF9-1AA42AD6A519}" type="slidenum">
               <a:rPr lang="en-US" smtClean="0"/>
-              <a:t>7</a:t>
+              <a:t>8</a:t>
             </a:fld>
             <a:endParaRPr lang="en-US"/>
           </a:p>
@@ -1401,7 +1508,7 @@
     </p:spTree>
     <p:extLst>
       <p:ext uri="{BB962C8B-B14F-4D97-AF65-F5344CB8AC3E}">
-        <p14:creationId xmlns:p14="http://schemas.microsoft.com/office/powerpoint/2010/main" val="3139730376"/>
+        <p14:creationId xmlns:p14="http://schemas.microsoft.com/office/powerpoint/2010/main" val="778062090"/>
       </p:ext>
     </p:extLst>
   </p:cSld>
@@ -1505,7 +1612,7 @@
     </p:spTree>
     <p:extLst>
       <p:ext uri="{BB962C8B-B14F-4D97-AF65-F5344CB8AC3E}">
-        <p14:creationId xmlns:p14="http://schemas.microsoft.com/office/powerpoint/2010/main" val="2058049328"/>
+        <p14:creationId xmlns:p14="http://schemas.microsoft.com/office/powerpoint/2010/main" val="520155400"/>
       </p:ext>
     </p:extLst>
   </p:cSld>
@@ -1600,7 +1707,7 @@
           <a:p>
             <a:fld id="{020CF8D1-BA82-5045-ACF9-1AA42AD6A519}" type="slidenum">
               <a:rPr lang="en-US" smtClean="0"/>
-              <a:t>11</a:t>
+              <a:t>12</a:t>
             </a:fld>
             <a:endParaRPr lang="en-US"/>
           </a:p>
@@ -1609,7 +1716,7 @@
     </p:spTree>
     <p:extLst>
       <p:ext uri="{BB962C8B-B14F-4D97-AF65-F5344CB8AC3E}">
-        <p14:creationId xmlns:p14="http://schemas.microsoft.com/office/powerpoint/2010/main" val="3387240734"/>
+        <p14:creationId xmlns:p14="http://schemas.microsoft.com/office/powerpoint/2010/main" val="2058049328"/>
       </p:ext>
     </p:extLst>
   </p:cSld>
@@ -5247,7 +5354,7 @@
           <a:p>
             <a:r>
               <a:rPr lang="en-US" dirty="0"/>
-              <a:t>Slide Template</a:t>
+              <a:t>Outline</a:t>
             </a:r>
           </a:p>
         </p:txBody>
@@ -5270,12 +5377,26 @@
         </p:nvSpPr>
         <p:spPr/>
         <p:txBody>
-          <a:bodyPr/>
+          <a:bodyPr>
+            <a:normAutofit/>
+          </a:bodyPr>
           <a:lstStyle/>
           <a:p>
             <a:r>
               <a:rPr lang="en-US" dirty="0"/>
-              <a:t>Body template</a:t>
+              <a:t>Requests Library overview</a:t>
+            </a:r>
+          </a:p>
+          <a:p>
+            <a:r>
+              <a:rPr lang="en-US" dirty="0"/>
+              <a:t>Requests methods, arguments, and objects</a:t>
+            </a:r>
+          </a:p>
+          <a:p>
+            <a:r>
+              <a:rPr lang="en-US" dirty="0"/>
+              <a:t>Basic Requests examples and exercises</a:t>
             </a:r>
           </a:p>
         </p:txBody>
@@ -5342,7 +5463,7 @@
     </p:spTree>
     <p:extLst>
       <p:ext uri="{BB962C8B-B14F-4D97-AF65-F5344CB8AC3E}">
-        <p14:creationId xmlns:p14="http://schemas.microsoft.com/office/powerpoint/2010/main" val="2063027843"/>
+        <p14:creationId xmlns:p14="http://schemas.microsoft.com/office/powerpoint/2010/main" val="2739176637"/>
       </p:ext>
     </p:extLst>
   </p:cSld>
@@ -5386,114 +5507,6 @@
           <p:cNvPr id="2" name="Title 1">
             <a:extLst>
               <a:ext uri="{FF2B5EF4-FFF2-40B4-BE49-F238E27FC236}">
-                <a16:creationId xmlns:a16="http://schemas.microsoft.com/office/drawing/2014/main" id="{9D8D6E4C-FC36-3E4C-9387-96DD20072D9D}"/>
-              </a:ext>
-            </a:extLst>
-          </p:cNvPr>
-          <p:cNvSpPr>
-            <a:spLocks noGrp="1"/>
-          </p:cNvSpPr>
-          <p:nvPr>
-            <p:ph type="ctrTitle"/>
-          </p:nvPr>
-        </p:nvSpPr>
-        <p:spPr>
-          <a:xfrm>
-            <a:off x="1524000" y="914013"/>
-            <a:ext cx="9144000" cy="2387600"/>
-          </a:xfrm>
-        </p:spPr>
-        <p:txBody>
-          <a:bodyPr/>
-          <a:lstStyle/>
-          <a:p>
-            <a:r>
-              <a:rPr lang="en-US" dirty="0"/>
-              <a:t>Part IV</a:t>
-            </a:r>
-          </a:p>
-        </p:txBody>
-      </p:sp>
-      <p:sp>
-        <p:nvSpPr>
-          <p:cNvPr id="3" name="Subtitle 2">
-            <a:extLst>
-              <a:ext uri="{FF2B5EF4-FFF2-40B4-BE49-F238E27FC236}">
-                <a16:creationId xmlns:a16="http://schemas.microsoft.com/office/drawing/2014/main" id="{0451A0DE-9D64-5A48-94B5-5B4E42709819}"/>
-              </a:ext>
-            </a:extLst>
-          </p:cNvPr>
-          <p:cNvSpPr>
-            <a:spLocks noGrp="1"/>
-          </p:cNvSpPr>
-          <p:nvPr>
-            <p:ph type="subTitle" idx="1"/>
-          </p:nvPr>
-        </p:nvSpPr>
-        <p:spPr>
-          <a:xfrm>
-            <a:off x="1524000" y="3393688"/>
-            <a:ext cx="9144000" cy="1655762"/>
-          </a:xfrm>
-        </p:spPr>
-        <p:txBody>
-          <a:bodyPr/>
-          <a:lstStyle/>
-          <a:p>
-            <a:r>
-              <a:rPr lang="en-US" dirty="0"/>
-              <a:t>Python Requests Syntax</a:t>
-            </a:r>
-          </a:p>
-        </p:txBody>
-      </p:sp>
-    </p:spTree>
-    <p:extLst>
-      <p:ext uri="{BB962C8B-B14F-4D97-AF65-F5344CB8AC3E}">
-        <p14:creationId xmlns:p14="http://schemas.microsoft.com/office/powerpoint/2010/main" val="1667231167"/>
-      </p:ext>
-    </p:extLst>
-  </p:cSld>
-  <p:clrMapOvr>
-    <a:masterClrMapping/>
-  </p:clrMapOvr>
-  <mc:AlternateContent xmlns:mc="http://schemas.openxmlformats.org/markup-compatibility/2006" xmlns:p14="http://schemas.microsoft.com/office/powerpoint/2010/main">
-    <mc:Choice Requires="p14">
-      <p:transition spd="med" p14:dur="700">
-        <p:fade/>
-      </p:transition>
-    </mc:Choice>
-    <mc:Fallback xmlns="">
-      <p:transition spd="med">
-        <p:fade/>
-      </p:transition>
-    </mc:Fallback>
-  </mc:AlternateContent>
-</p:sld>
-</file>
-
-<file path=ppt/slides/slide12.xml><?xml version="1.0" encoding="utf-8"?>
-<p:sld xmlns:a="http://schemas.openxmlformats.org/drawingml/2006/main" xmlns:r="http://schemas.openxmlformats.org/officeDocument/2006/relationships" xmlns:p="http://schemas.openxmlformats.org/presentationml/2006/main">
-  <p:cSld>
-    <p:spTree>
-      <p:nvGrpSpPr>
-        <p:cNvPr id="1" name=""/>
-        <p:cNvGrpSpPr/>
-        <p:nvPr/>
-      </p:nvGrpSpPr>
-      <p:grpSpPr>
-        <a:xfrm>
-          <a:off x="0" y="0"/>
-          <a:ext cx="0" cy="0"/>
-          <a:chOff x="0" y="0"/>
-          <a:chExt cx="0" cy="0"/>
-        </a:xfrm>
-      </p:grpSpPr>
-      <p:sp>
-        <p:nvSpPr>
-          <p:cNvPr id="2" name="Title 1">
-            <a:extLst>
-              <a:ext uri="{FF2B5EF4-FFF2-40B4-BE49-F238E27FC236}">
                 <a16:creationId xmlns:a16="http://schemas.microsoft.com/office/drawing/2014/main" id="{EB7C4089-1746-624B-8E73-D3DAB8E88CDD}"/>
               </a:ext>
             </a:extLst>
@@ -5570,7 +5583,7 @@
             <a:fld id="{A44B02FA-DD2D-1844-AE35-8B2EAB0CF4EF}" type="slidenum">
               <a:rPr lang="en-US" smtClean="0"/>
               <a:pPr/>
-              <a:t>12</a:t>
+              <a:t>11</a:t>
             </a:fld>
             <a:endParaRPr lang="en-US" dirty="0"/>
           </a:p>
@@ -6072,6 +6085,114 @@
 </p:sld>
 </file>
 
+<file path=ppt/slides/slide12.xml><?xml version="1.0" encoding="utf-8"?>
+<p:sld xmlns:a="http://schemas.openxmlformats.org/drawingml/2006/main" xmlns:r="http://schemas.openxmlformats.org/officeDocument/2006/relationships" xmlns:p="http://schemas.openxmlformats.org/presentationml/2006/main">
+  <p:cSld>
+    <p:spTree>
+      <p:nvGrpSpPr>
+        <p:cNvPr id="1" name=""/>
+        <p:cNvGrpSpPr/>
+        <p:nvPr/>
+      </p:nvGrpSpPr>
+      <p:grpSpPr>
+        <a:xfrm>
+          <a:off x="0" y="0"/>
+          <a:ext cx="0" cy="0"/>
+          <a:chOff x="0" y="0"/>
+          <a:chExt cx="0" cy="0"/>
+        </a:xfrm>
+      </p:grpSpPr>
+      <p:sp>
+        <p:nvSpPr>
+          <p:cNvPr id="2" name="Title 1">
+            <a:extLst>
+              <a:ext uri="{FF2B5EF4-FFF2-40B4-BE49-F238E27FC236}">
+                <a16:creationId xmlns:a16="http://schemas.microsoft.com/office/drawing/2014/main" id="{9D8D6E4C-FC36-3E4C-9387-96DD20072D9D}"/>
+              </a:ext>
+            </a:extLst>
+          </p:cNvPr>
+          <p:cNvSpPr>
+            <a:spLocks noGrp="1"/>
+          </p:cNvSpPr>
+          <p:nvPr>
+            <p:ph type="ctrTitle"/>
+          </p:nvPr>
+        </p:nvSpPr>
+        <p:spPr>
+          <a:xfrm>
+            <a:off x="1524000" y="914013"/>
+            <a:ext cx="9144000" cy="2387600"/>
+          </a:xfrm>
+        </p:spPr>
+        <p:txBody>
+          <a:bodyPr/>
+          <a:lstStyle/>
+          <a:p>
+            <a:r>
+              <a:rPr lang="en-US" dirty="0"/>
+              <a:t>Part IV</a:t>
+            </a:r>
+          </a:p>
+        </p:txBody>
+      </p:sp>
+      <p:sp>
+        <p:nvSpPr>
+          <p:cNvPr id="3" name="Subtitle 2">
+            <a:extLst>
+              <a:ext uri="{FF2B5EF4-FFF2-40B4-BE49-F238E27FC236}">
+                <a16:creationId xmlns:a16="http://schemas.microsoft.com/office/drawing/2014/main" id="{0451A0DE-9D64-5A48-94B5-5B4E42709819}"/>
+              </a:ext>
+            </a:extLst>
+          </p:cNvPr>
+          <p:cNvSpPr>
+            <a:spLocks noGrp="1"/>
+          </p:cNvSpPr>
+          <p:nvPr>
+            <p:ph type="subTitle" idx="1"/>
+          </p:nvPr>
+        </p:nvSpPr>
+        <p:spPr>
+          <a:xfrm>
+            <a:off x="1524000" y="3393688"/>
+            <a:ext cx="9144000" cy="1655762"/>
+          </a:xfrm>
+        </p:spPr>
+        <p:txBody>
+          <a:bodyPr/>
+          <a:lstStyle/>
+          <a:p>
+            <a:r>
+              <a:rPr lang="en-US" dirty="0"/>
+              <a:t>Cisco Platform APIs Overview</a:t>
+            </a:r>
+          </a:p>
+        </p:txBody>
+      </p:sp>
+    </p:spTree>
+    <p:extLst>
+      <p:ext uri="{BB962C8B-B14F-4D97-AF65-F5344CB8AC3E}">
+        <p14:creationId xmlns:p14="http://schemas.microsoft.com/office/powerpoint/2010/main" val="899135878"/>
+      </p:ext>
+    </p:extLst>
+  </p:cSld>
+  <p:clrMapOvr>
+    <a:masterClrMapping/>
+  </p:clrMapOvr>
+  <mc:AlternateContent xmlns:mc="http://schemas.openxmlformats.org/markup-compatibility/2006" xmlns:p14="http://schemas.microsoft.com/office/powerpoint/2010/main">
+    <mc:Choice Requires="p14">
+      <p:transition spd="med" p14:dur="700">
+        <p:fade/>
+      </p:transition>
+    </mc:Choice>
+    <mc:Fallback xmlns="">
+      <p:transition spd="med">
+        <p:fade/>
+      </p:transition>
+    </mc:Fallback>
+  </mc:AlternateContent>
+</p:sld>
+</file>
+
 <file path=ppt/slides/slide13.xml><?xml version="1.0" encoding="utf-8"?>
 <p:sld xmlns:a="http://schemas.openxmlformats.org/drawingml/2006/main" xmlns:r="http://schemas.openxmlformats.org/officeDocument/2006/relationships" xmlns:p="http://schemas.openxmlformats.org/presentationml/2006/main">
   <p:cSld>
@@ -6094,7 +6215,7 @@
           <p:cNvPr id="2" name="Title 1">
             <a:extLst>
               <a:ext uri="{FF2B5EF4-FFF2-40B4-BE49-F238E27FC236}">
-                <a16:creationId xmlns:a16="http://schemas.microsoft.com/office/drawing/2014/main" id="{9D8D6E4C-FC36-3E4C-9387-96DD20072D9D}"/>
+                <a16:creationId xmlns:a16="http://schemas.microsoft.com/office/drawing/2014/main" id="{EB7C4089-1746-624B-8E73-D3DAB8E88CDD}"/>
               </a:ext>
             </a:extLst>
           </p:cNvPr>
@@ -6102,32 +6223,27 @@
             <a:spLocks noGrp="1"/>
           </p:cNvSpPr>
           <p:nvPr>
-            <p:ph type="ctrTitle"/>
-          </p:nvPr>
-        </p:nvSpPr>
-        <p:spPr>
-          <a:xfrm>
-            <a:off x="1524000" y="914013"/>
-            <a:ext cx="9144000" cy="2387600"/>
-          </a:xfrm>
-        </p:spPr>
+            <p:ph type="title"/>
+          </p:nvPr>
+        </p:nvSpPr>
+        <p:spPr/>
         <p:txBody>
           <a:bodyPr/>
           <a:lstStyle/>
           <a:p>
             <a:r>
               <a:rPr lang="en-US" dirty="0"/>
-              <a:t>Part V</a:t>
-            </a:r>
-          </a:p>
-        </p:txBody>
-      </p:sp>
-      <p:sp>
-        <p:nvSpPr>
-          <p:cNvPr id="3" name="Subtitle 2">
+              <a:t>Outline</a:t>
+            </a:r>
+          </a:p>
+        </p:txBody>
+      </p:sp>
+      <p:sp>
+        <p:nvSpPr>
+          <p:cNvPr id="3" name="Content Placeholder 2">
             <a:extLst>
               <a:ext uri="{FF2B5EF4-FFF2-40B4-BE49-F238E27FC236}">
-                <a16:creationId xmlns:a16="http://schemas.microsoft.com/office/drawing/2014/main" id="{0451A0DE-9D64-5A48-94B5-5B4E42709819}"/>
+                <a16:creationId xmlns:a16="http://schemas.microsoft.com/office/drawing/2014/main" id="{65426B10-0364-A849-B3A4-1D0DA409155A}"/>
               </a:ext>
             </a:extLst>
           </p:cNvPr>
@@ -6135,30 +6251,159 @@
             <a:spLocks noGrp="1"/>
           </p:cNvSpPr>
           <p:nvPr>
-            <p:ph type="subTitle" idx="1"/>
-          </p:nvPr>
-        </p:nvSpPr>
-        <p:spPr>
-          <a:xfrm>
-            <a:off x="1524000" y="3393688"/>
-            <a:ext cx="9144000" cy="1655762"/>
-          </a:xfrm>
-        </p:spPr>
-        <p:txBody>
-          <a:bodyPr/>
+            <p:ph idx="1"/>
+          </p:nvPr>
+        </p:nvSpPr>
+        <p:spPr/>
+        <p:txBody>
+          <a:bodyPr>
+            <a:normAutofit lnSpcReduction="10000"/>
+          </a:bodyPr>
           <a:lstStyle/>
           <a:p>
             <a:r>
               <a:rPr lang="en-US" dirty="0"/>
-              <a:t>Make REST API Calls With Python Requests</a:t>
-            </a:r>
+              <a:t>For each of these platforms:</a:t>
+            </a:r>
+          </a:p>
+          <a:p>
+            <a:pPr lvl="1"/>
+            <a:r>
+              <a:rPr lang="en-US" dirty="0"/>
+              <a:t>DNAC</a:t>
+            </a:r>
+          </a:p>
+          <a:p>
+            <a:pPr lvl="1"/>
+            <a:r>
+              <a:rPr lang="en-US" dirty="0" err="1"/>
+              <a:t>Webex</a:t>
+            </a:r>
+            <a:r>
+              <a:rPr lang="en-US" dirty="0"/>
+              <a:t> Teams</a:t>
+            </a:r>
+          </a:p>
+          <a:p>
+            <a:pPr lvl="1"/>
+            <a:r>
+              <a:rPr lang="en-US" dirty="0"/>
+              <a:t>Meraki</a:t>
+            </a:r>
+          </a:p>
+          <a:p>
+            <a:pPr lvl="1"/>
+            <a:r>
+              <a:rPr lang="en-US" dirty="0"/>
+              <a:t>ACI</a:t>
+            </a:r>
+          </a:p>
+          <a:p>
+            <a:pPr lvl="1"/>
+            <a:r>
+              <a:rPr lang="en-US" dirty="0"/>
+              <a:t>Firepower</a:t>
+            </a:r>
+          </a:p>
+          <a:p>
+            <a:pPr lvl="1"/>
+            <a:r>
+              <a:rPr lang="en-US" dirty="0"/>
+              <a:t>SD-WAN</a:t>
+            </a:r>
+          </a:p>
+          <a:p>
+            <a:r>
+              <a:rPr lang="en-US" dirty="0"/>
+              <a:t>Perform the following tasks:</a:t>
+            </a:r>
+          </a:p>
+          <a:p>
+            <a:pPr lvl="1"/>
+            <a:r>
+              <a:rPr lang="en-US" dirty="0"/>
+              <a:t>Platform summary overview</a:t>
+            </a:r>
+          </a:p>
+          <a:p>
+            <a:pPr lvl="1"/>
+            <a:r>
+              <a:rPr lang="en-US" dirty="0"/>
+              <a:t>Review API documentation </a:t>
+            </a:r>
+          </a:p>
+          <a:p>
+            <a:pPr lvl="1"/>
+            <a:r>
+              <a:rPr lang="en-US" dirty="0"/>
+              <a:t>Review resources available for programmatic access/practice/testing</a:t>
+            </a:r>
+          </a:p>
+        </p:txBody>
+      </p:sp>
+      <p:sp>
+        <p:nvSpPr>
+          <p:cNvPr id="4" name="Date Placeholder 3">
+            <a:extLst>
+              <a:ext uri="{FF2B5EF4-FFF2-40B4-BE49-F238E27FC236}">
+                <a16:creationId xmlns:a16="http://schemas.microsoft.com/office/drawing/2014/main" id="{7ECEAF79-F4AC-E94E-9E55-220D0D396924}"/>
+              </a:ext>
+            </a:extLst>
+          </p:cNvPr>
+          <p:cNvSpPr>
+            <a:spLocks noGrp="1"/>
+          </p:cNvSpPr>
+          <p:nvPr>
+            <p:ph type="dt" sz="half" idx="10"/>
+          </p:nvPr>
+        </p:nvSpPr>
+        <p:spPr/>
+        <p:txBody>
+          <a:bodyPr/>
+          <a:lstStyle/>
+          <a:p>
+            <a:r>
+              <a:rPr lang="en-US"/>
+              <a:t>World Wide Technology ©</a:t>
+            </a:r>
+            <a:endParaRPr lang="en-US" dirty="0"/>
+          </a:p>
+        </p:txBody>
+      </p:sp>
+      <p:sp>
+        <p:nvSpPr>
+          <p:cNvPr id="5" name="Slide Number Placeholder 4">
+            <a:extLst>
+              <a:ext uri="{FF2B5EF4-FFF2-40B4-BE49-F238E27FC236}">
+                <a16:creationId xmlns:a16="http://schemas.microsoft.com/office/drawing/2014/main" id="{372DC1A4-CE8B-DB4A-8F86-2508518C35D3}"/>
+              </a:ext>
+            </a:extLst>
+          </p:cNvPr>
+          <p:cNvSpPr>
+            <a:spLocks noGrp="1"/>
+          </p:cNvSpPr>
+          <p:nvPr>
+            <p:ph type="sldNum" sz="quarter" idx="12"/>
+          </p:nvPr>
+        </p:nvSpPr>
+        <p:spPr/>
+        <p:txBody>
+          <a:bodyPr/>
+          <a:lstStyle/>
+          <a:p>
+            <a:fld id="{A44B02FA-DD2D-1844-AE35-8B2EAB0CF4EF}" type="slidenum">
+              <a:rPr lang="en-US" smtClean="0"/>
+              <a:pPr/>
+              <a:t>13</a:t>
+            </a:fld>
+            <a:endParaRPr lang="en-US" dirty="0"/>
           </a:p>
         </p:txBody>
       </p:sp>
     </p:spTree>
     <p:extLst>
       <p:ext uri="{BB962C8B-B14F-4D97-AF65-F5344CB8AC3E}">
-        <p14:creationId xmlns:p14="http://schemas.microsoft.com/office/powerpoint/2010/main" val="4074034134"/>
+        <p14:creationId xmlns:p14="http://schemas.microsoft.com/office/powerpoint/2010/main" val="1513264745"/>
       </p:ext>
     </p:extLst>
   </p:cSld>
@@ -6202,7 +6447,7 @@
           <p:cNvPr id="2" name="Title 1">
             <a:extLst>
               <a:ext uri="{FF2B5EF4-FFF2-40B4-BE49-F238E27FC236}">
-                <a16:creationId xmlns:a16="http://schemas.microsoft.com/office/drawing/2014/main" id="{EB7C4089-1746-624B-8E73-D3DAB8E88CDD}"/>
+                <a16:creationId xmlns:a16="http://schemas.microsoft.com/office/drawing/2014/main" id="{9D8D6E4C-FC36-3E4C-9387-96DD20072D9D}"/>
               </a:ext>
             </a:extLst>
           </p:cNvPr>
@@ -6210,27 +6455,32 @@
             <a:spLocks noGrp="1"/>
           </p:cNvSpPr>
           <p:nvPr>
-            <p:ph type="title"/>
-          </p:nvPr>
-        </p:nvSpPr>
-        <p:spPr/>
+            <p:ph type="ctrTitle"/>
+          </p:nvPr>
+        </p:nvSpPr>
+        <p:spPr>
+          <a:xfrm>
+            <a:off x="1524000" y="914013"/>
+            <a:ext cx="9144000" cy="2387600"/>
+          </a:xfrm>
+        </p:spPr>
         <p:txBody>
           <a:bodyPr/>
           <a:lstStyle/>
           <a:p>
             <a:r>
               <a:rPr lang="en-US" dirty="0"/>
-              <a:t>Slide Template</a:t>
-            </a:r>
-          </a:p>
-        </p:txBody>
-      </p:sp>
-      <p:sp>
-        <p:nvSpPr>
-          <p:cNvPr id="3" name="Content Placeholder 2">
+              <a:t>Part V</a:t>
+            </a:r>
+          </a:p>
+        </p:txBody>
+      </p:sp>
+      <p:sp>
+        <p:nvSpPr>
+          <p:cNvPr id="3" name="Subtitle 2">
             <a:extLst>
               <a:ext uri="{FF2B5EF4-FFF2-40B4-BE49-F238E27FC236}">
-                <a16:creationId xmlns:a16="http://schemas.microsoft.com/office/drawing/2014/main" id="{65426B10-0364-A849-B3A4-1D0DA409155A}"/>
+                <a16:creationId xmlns:a16="http://schemas.microsoft.com/office/drawing/2014/main" id="{0451A0DE-9D64-5A48-94B5-5B4E42709819}"/>
               </a:ext>
             </a:extLst>
           </p:cNvPr>
@@ -6238,76 +6488,27 @@
             <a:spLocks noGrp="1"/>
           </p:cNvSpPr>
           <p:nvPr>
-            <p:ph idx="1"/>
-          </p:nvPr>
-        </p:nvSpPr>
-        <p:spPr/>
+            <p:ph type="subTitle" idx="1"/>
+          </p:nvPr>
+        </p:nvSpPr>
+        <p:spPr>
+          <a:xfrm>
+            <a:off x="1524000" y="3393688"/>
+            <a:ext cx="9144000" cy="1655762"/>
+          </a:xfrm>
+        </p:spPr>
         <p:txBody>
           <a:bodyPr/>
           <a:lstStyle/>
           <a:p>
             <a:r>
               <a:rPr lang="en-US" dirty="0"/>
-              <a:t>Body template</a:t>
-            </a:r>
-          </a:p>
-        </p:txBody>
-      </p:sp>
-      <p:sp>
-        <p:nvSpPr>
-          <p:cNvPr id="4" name="Date Placeholder 3">
-            <a:extLst>
-              <a:ext uri="{FF2B5EF4-FFF2-40B4-BE49-F238E27FC236}">
-                <a16:creationId xmlns:a16="http://schemas.microsoft.com/office/drawing/2014/main" id="{7ECEAF79-F4AC-E94E-9E55-220D0D396924}"/>
-              </a:ext>
-            </a:extLst>
-          </p:cNvPr>
-          <p:cNvSpPr>
-            <a:spLocks noGrp="1"/>
-          </p:cNvSpPr>
-          <p:nvPr>
-            <p:ph type="dt" sz="half" idx="10"/>
-          </p:nvPr>
-        </p:nvSpPr>
-        <p:spPr/>
-        <p:txBody>
-          <a:bodyPr/>
-          <a:lstStyle/>
-          <a:p>
-            <a:r>
-              <a:rPr lang="en-US"/>
-              <a:t>World Wide Technology ©</a:t>
-            </a:r>
-            <a:endParaRPr lang="en-US" dirty="0"/>
-          </a:p>
-        </p:txBody>
-      </p:sp>
-      <p:sp>
-        <p:nvSpPr>
-          <p:cNvPr id="5" name="Slide Number Placeholder 4">
-            <a:extLst>
-              <a:ext uri="{FF2B5EF4-FFF2-40B4-BE49-F238E27FC236}">
-                <a16:creationId xmlns:a16="http://schemas.microsoft.com/office/drawing/2014/main" id="{372DC1A4-CE8B-DB4A-8F86-2508518C35D3}"/>
-              </a:ext>
-            </a:extLst>
-          </p:cNvPr>
-          <p:cNvSpPr>
-            <a:spLocks noGrp="1"/>
-          </p:cNvSpPr>
-          <p:nvPr>
-            <p:ph type="sldNum" sz="quarter" idx="12"/>
-          </p:nvPr>
-        </p:nvSpPr>
-        <p:spPr/>
-        <p:txBody>
-          <a:bodyPr/>
-          <a:lstStyle/>
-          <a:p>
-            <a:fld id="{A44B02FA-DD2D-1844-AE35-8B2EAB0CF4EF}" type="slidenum">
-              <a:rPr lang="en-US" smtClean="0"/>
-              <a:pPr/>
-              <a:t>14</a:t>
-            </a:fld>
+              <a:t>Interact With Cisco Platform APIs Using </a:t>
+            </a:r>
+            <a:r>
+              <a:rPr lang="en-US" dirty="0" err="1"/>
+              <a:t>cURL</a:t>
+            </a:r>
             <a:endParaRPr lang="en-US" dirty="0"/>
           </a:p>
         </p:txBody>
@@ -6315,7 +6516,7 @@
     </p:spTree>
     <p:extLst>
       <p:ext uri="{BB962C8B-B14F-4D97-AF65-F5344CB8AC3E}">
-        <p14:creationId xmlns:p14="http://schemas.microsoft.com/office/powerpoint/2010/main" val="2709408928"/>
+        <p14:creationId xmlns:p14="http://schemas.microsoft.com/office/powerpoint/2010/main" val="2203929534"/>
       </p:ext>
     </p:extLst>
   </p:cSld>
@@ -6356,10 +6557,141 @@
       </p:grpSpPr>
       <p:sp>
         <p:nvSpPr>
+          <p:cNvPr id="2" name="Title 1">
+            <a:extLst>
+              <a:ext uri="{FF2B5EF4-FFF2-40B4-BE49-F238E27FC236}">
+                <a16:creationId xmlns:a16="http://schemas.microsoft.com/office/drawing/2014/main" id="{EB7C4089-1746-624B-8E73-D3DAB8E88CDD}"/>
+              </a:ext>
+            </a:extLst>
+          </p:cNvPr>
+          <p:cNvSpPr>
+            <a:spLocks noGrp="1"/>
+          </p:cNvSpPr>
+          <p:nvPr>
+            <p:ph type="title"/>
+          </p:nvPr>
+        </p:nvSpPr>
+        <p:spPr/>
+        <p:txBody>
+          <a:bodyPr/>
+          <a:lstStyle/>
+          <a:p>
+            <a:r>
+              <a:rPr lang="en-US" dirty="0"/>
+              <a:t>Outline</a:t>
+            </a:r>
+          </a:p>
+        </p:txBody>
+      </p:sp>
+      <p:sp>
+        <p:nvSpPr>
+          <p:cNvPr id="3" name="Content Placeholder 2">
+            <a:extLst>
+              <a:ext uri="{FF2B5EF4-FFF2-40B4-BE49-F238E27FC236}">
+                <a16:creationId xmlns:a16="http://schemas.microsoft.com/office/drawing/2014/main" id="{65426B10-0364-A849-B3A4-1D0DA409155A}"/>
+              </a:ext>
+            </a:extLst>
+          </p:cNvPr>
+          <p:cNvSpPr>
+            <a:spLocks noGrp="1"/>
+          </p:cNvSpPr>
+          <p:nvPr>
+            <p:ph idx="1"/>
+          </p:nvPr>
+        </p:nvSpPr>
+        <p:spPr/>
+        <p:txBody>
+          <a:bodyPr/>
+          <a:lstStyle/>
+          <a:p>
+            <a:r>
+              <a:rPr lang="en-US" dirty="0"/>
+              <a:t>For each of these platforms:</a:t>
+            </a:r>
+          </a:p>
+          <a:p>
+            <a:pPr lvl="1"/>
+            <a:r>
+              <a:rPr lang="en-US" dirty="0"/>
+              <a:t>DNAC</a:t>
+            </a:r>
+          </a:p>
+          <a:p>
+            <a:pPr lvl="1"/>
+            <a:r>
+              <a:rPr lang="en-US" dirty="0" err="1"/>
+              <a:t>Webex</a:t>
+            </a:r>
+            <a:r>
+              <a:rPr lang="en-US" dirty="0"/>
+              <a:t> Teams</a:t>
+            </a:r>
+          </a:p>
+          <a:p>
+            <a:pPr lvl="1"/>
+            <a:r>
+              <a:rPr lang="en-US" dirty="0"/>
+              <a:t>Meraki</a:t>
+            </a:r>
+          </a:p>
+          <a:p>
+            <a:pPr lvl="1"/>
+            <a:r>
+              <a:rPr lang="en-US" dirty="0"/>
+              <a:t>ACI</a:t>
+            </a:r>
+          </a:p>
+          <a:p>
+            <a:r>
+              <a:rPr lang="en-US" dirty="0"/>
+              <a:t>Perform the following tasks:</a:t>
+            </a:r>
+          </a:p>
+          <a:p>
+            <a:pPr lvl="1"/>
+            <a:r>
+              <a:rPr lang="en-US" dirty="0"/>
+              <a:t>Understand authentication methodology</a:t>
+            </a:r>
+          </a:p>
+          <a:p>
+            <a:pPr lvl="1"/>
+            <a:r>
+              <a:rPr lang="en-US" dirty="0"/>
+              <a:t>Build </a:t>
+            </a:r>
+            <a:r>
+              <a:rPr lang="en-US" dirty="0" err="1"/>
+              <a:t>cURL</a:t>
+            </a:r>
+            <a:r>
+              <a:rPr lang="en-US" dirty="0"/>
+              <a:t> request to authenticate</a:t>
+            </a:r>
+          </a:p>
+          <a:p>
+            <a:pPr lvl="1"/>
+            <a:r>
+              <a:rPr lang="en-US" dirty="0"/>
+              <a:t>Build </a:t>
+            </a:r>
+            <a:r>
+              <a:rPr lang="en-US" dirty="0" err="1"/>
+              <a:t>cURL</a:t>
+            </a:r>
+            <a:r>
+              <a:rPr lang="en-US" dirty="0"/>
+              <a:t> request(s) to read/write data</a:t>
+            </a:r>
+          </a:p>
+        </p:txBody>
+      </p:sp>
+      <p:sp>
+        <p:nvSpPr>
           <p:cNvPr id="4" name="Date Placeholder 3">
             <a:extLst>
               <a:ext uri="{FF2B5EF4-FFF2-40B4-BE49-F238E27FC236}">
-                <a16:creationId xmlns:a16="http://schemas.microsoft.com/office/drawing/2014/main" id="{0CD670A9-B06A-3448-BABA-FAD627500859}"/>
+                <a16:creationId xmlns:a16="http://schemas.microsoft.com/office/drawing/2014/main" id="{7ECEAF79-F4AC-E94E-9E55-220D0D396924}"/>
               </a:ext>
             </a:extLst>
           </p:cNvPr>
@@ -6388,7 +6720,7 @@
           <p:cNvPr id="5" name="Slide Number Placeholder 4">
             <a:extLst>
               <a:ext uri="{FF2B5EF4-FFF2-40B4-BE49-F238E27FC236}">
-                <a16:creationId xmlns:a16="http://schemas.microsoft.com/office/drawing/2014/main" id="{119DACAD-17C1-C249-A498-C4A1A1ADD334}"/>
+                <a16:creationId xmlns:a16="http://schemas.microsoft.com/office/drawing/2014/main" id="{372DC1A4-CE8B-DB4A-8F86-2508518C35D3}"/>
               </a:ext>
             </a:extLst>
           </p:cNvPr>
@@ -6416,7 +6748,7 @@
     </p:spTree>
     <p:extLst>
       <p:ext uri="{BB962C8B-B14F-4D97-AF65-F5344CB8AC3E}">
-        <p14:creationId xmlns:p14="http://schemas.microsoft.com/office/powerpoint/2010/main" val="825250539"/>
+        <p14:creationId xmlns:p14="http://schemas.microsoft.com/office/powerpoint/2010/main" val="2063027843"/>
       </p:ext>
     </p:extLst>
   </p:cSld>
@@ -6460,7 +6792,7 @@
           <p:cNvPr id="2" name="Title 1">
             <a:extLst>
               <a:ext uri="{FF2B5EF4-FFF2-40B4-BE49-F238E27FC236}">
-                <a16:creationId xmlns:a16="http://schemas.microsoft.com/office/drawing/2014/main" id="{EB7C4089-1746-624B-8E73-D3DAB8E88CDD}"/>
+                <a16:creationId xmlns:a16="http://schemas.microsoft.com/office/drawing/2014/main" id="{9D8D6E4C-FC36-3E4C-9387-96DD20072D9D}"/>
               </a:ext>
             </a:extLst>
           </p:cNvPr>
@@ -6468,27 +6800,32 @@
             <a:spLocks noGrp="1"/>
           </p:cNvSpPr>
           <p:nvPr>
-            <p:ph type="title"/>
-          </p:nvPr>
-        </p:nvSpPr>
-        <p:spPr/>
+            <p:ph type="ctrTitle"/>
+          </p:nvPr>
+        </p:nvSpPr>
+        <p:spPr>
+          <a:xfrm>
+            <a:off x="1524000" y="914013"/>
+            <a:ext cx="9144000" cy="2387600"/>
+          </a:xfrm>
+        </p:spPr>
         <p:txBody>
           <a:bodyPr/>
           <a:lstStyle/>
           <a:p>
             <a:r>
               <a:rPr lang="en-US" dirty="0"/>
-              <a:t>References</a:t>
-            </a:r>
-          </a:p>
-        </p:txBody>
-      </p:sp>
-      <p:sp>
-        <p:nvSpPr>
-          <p:cNvPr id="3" name="Content Placeholder 2">
+              <a:t>Part VI</a:t>
+            </a:r>
+          </a:p>
+        </p:txBody>
+      </p:sp>
+      <p:sp>
+        <p:nvSpPr>
+          <p:cNvPr id="3" name="Subtitle 2">
             <a:extLst>
               <a:ext uri="{FF2B5EF4-FFF2-40B4-BE49-F238E27FC236}">
-                <a16:creationId xmlns:a16="http://schemas.microsoft.com/office/drawing/2014/main" id="{65426B10-0364-A849-B3A4-1D0DA409155A}"/>
+                <a16:creationId xmlns:a16="http://schemas.microsoft.com/office/drawing/2014/main" id="{0451A0DE-9D64-5A48-94B5-5B4E42709819}"/>
               </a:ext>
             </a:extLst>
           </p:cNvPr>
@@ -6496,132 +6833,30 @@
             <a:spLocks noGrp="1"/>
           </p:cNvSpPr>
           <p:nvPr>
-            <p:ph idx="1"/>
-          </p:nvPr>
-        </p:nvSpPr>
-        <p:spPr/>
-        <p:txBody>
-          <a:bodyPr/>
-          <a:lstStyle/>
-          <a:p>
-            <a:r>
-              <a:rPr lang="en-US" dirty="0">
-                <a:hlinkClick r:id="rId2"/>
-              </a:rPr>
-              <a:t>https://en.wikipedia.org/wiki/CURL</a:t>
-            </a:r>
-            <a:endParaRPr lang="en-US" dirty="0"/>
-          </a:p>
-          <a:p>
-            <a:r>
-              <a:rPr lang="en-US" dirty="0">
-                <a:hlinkClick r:id="rId3"/>
-              </a:rPr>
-              <a:t>https://en.wikipedia.org/wiki/Requests_%28software%29</a:t>
-            </a:r>
-            <a:endParaRPr lang="en-US" dirty="0"/>
-          </a:p>
-          <a:p>
-            <a:r>
-              <a:rPr lang="en-US" dirty="0">
-                <a:hlinkClick r:id="rId4"/>
-              </a:rPr>
-              <a:t>https://curl.haxx.se</a:t>
-            </a:r>
-            <a:endParaRPr lang="en-US" dirty="0"/>
-          </a:p>
-          <a:p>
-            <a:r>
-              <a:rPr lang="en-US" dirty="0">
-                <a:hlinkClick r:id="rId5"/>
-              </a:rPr>
-              <a:t>https://requests.readthedocs.io/en/master/</a:t>
-            </a:r>
-            <a:endParaRPr lang="en-US" dirty="0"/>
-          </a:p>
+            <p:ph type="subTitle" idx="1"/>
+          </p:nvPr>
+        </p:nvSpPr>
+        <p:spPr>
+          <a:xfrm>
+            <a:off x="1524000" y="3393688"/>
+            <a:ext cx="9144000" cy="1655762"/>
+          </a:xfrm>
+        </p:spPr>
+        <p:txBody>
+          <a:bodyPr/>
+          <a:lstStyle/>
           <a:p>
             <a:r>
               <a:rPr lang="en-US" dirty="0"/>
-              <a:t>Cisco API documentation #1</a:t>
-            </a:r>
-          </a:p>
-          <a:p>
-            <a:r>
-              <a:rPr lang="en-US" dirty="0"/>
-              <a:t>Cisco API documentation #2</a:t>
-            </a:r>
-          </a:p>
-          <a:p>
-            <a:r>
-              <a:rPr lang="en-US" dirty="0"/>
-              <a:t>Cisco API documentation #3</a:t>
-            </a:r>
-          </a:p>
-        </p:txBody>
-      </p:sp>
-      <p:sp>
-        <p:nvSpPr>
-          <p:cNvPr id="4" name="Date Placeholder 3">
-            <a:extLst>
-              <a:ext uri="{FF2B5EF4-FFF2-40B4-BE49-F238E27FC236}">
-                <a16:creationId xmlns:a16="http://schemas.microsoft.com/office/drawing/2014/main" id="{7ECEAF79-F4AC-E94E-9E55-220D0D396924}"/>
-              </a:ext>
-            </a:extLst>
-          </p:cNvPr>
-          <p:cNvSpPr>
-            <a:spLocks noGrp="1"/>
-          </p:cNvSpPr>
-          <p:nvPr>
-            <p:ph type="dt" sz="half" idx="10"/>
-          </p:nvPr>
-        </p:nvSpPr>
-        <p:spPr/>
-        <p:txBody>
-          <a:bodyPr/>
-          <a:lstStyle/>
-          <a:p>
-            <a:r>
-              <a:rPr lang="en-US"/>
-              <a:t>World Wide Technology ©</a:t>
-            </a:r>
-            <a:endParaRPr lang="en-US" dirty="0"/>
-          </a:p>
-        </p:txBody>
-      </p:sp>
-      <p:sp>
-        <p:nvSpPr>
-          <p:cNvPr id="5" name="Slide Number Placeholder 4">
-            <a:extLst>
-              <a:ext uri="{FF2B5EF4-FFF2-40B4-BE49-F238E27FC236}">
-                <a16:creationId xmlns:a16="http://schemas.microsoft.com/office/drawing/2014/main" id="{372DC1A4-CE8B-DB4A-8F86-2508518C35D3}"/>
-              </a:ext>
-            </a:extLst>
-          </p:cNvPr>
-          <p:cNvSpPr>
-            <a:spLocks noGrp="1"/>
-          </p:cNvSpPr>
-          <p:nvPr>
-            <p:ph type="sldNum" sz="quarter" idx="12"/>
-          </p:nvPr>
-        </p:nvSpPr>
-        <p:spPr/>
-        <p:txBody>
-          <a:bodyPr/>
-          <a:lstStyle/>
-          <a:p>
-            <a:fld id="{A44B02FA-DD2D-1844-AE35-8B2EAB0CF4EF}" type="slidenum">
-              <a:rPr lang="en-US" smtClean="0"/>
-              <a:pPr/>
-              <a:t>16</a:t>
-            </a:fld>
-            <a:endParaRPr lang="en-US" dirty="0"/>
+              <a:t>Interact With Cisco Platform APIs Using Python Requests</a:t>
+            </a:r>
           </a:p>
         </p:txBody>
       </p:sp>
     </p:spTree>
     <p:extLst>
       <p:ext uri="{BB962C8B-B14F-4D97-AF65-F5344CB8AC3E}">
-        <p14:creationId xmlns:p14="http://schemas.microsoft.com/office/powerpoint/2010/main" val="3225595977"/>
+        <p14:creationId xmlns:p14="http://schemas.microsoft.com/office/powerpoint/2010/main" val="4218248441"/>
       </p:ext>
     </p:extLst>
   </p:cSld>
@@ -6660,40 +6895,184 @@
           <a:chExt cx="0" cy="0"/>
         </a:xfrm>
       </p:grpSpPr>
-      <p:pic>
-        <p:nvPicPr>
-          <p:cNvPr id="3" name="Picture 2" descr="A picture containing clock&#10;&#10;Description automatically generated">
+      <p:sp>
+        <p:nvSpPr>
+          <p:cNvPr id="2" name="Title 1">
             <a:extLst>
               <a:ext uri="{FF2B5EF4-FFF2-40B4-BE49-F238E27FC236}">
-                <a16:creationId xmlns:a16="http://schemas.microsoft.com/office/drawing/2014/main" id="{C01961D0-491D-0649-931E-32C2C883D902}"/>
+                <a16:creationId xmlns:a16="http://schemas.microsoft.com/office/drawing/2014/main" id="{EB7C4089-1746-624B-8E73-D3DAB8E88CDD}"/>
               </a:ext>
             </a:extLst>
           </p:cNvPr>
-          <p:cNvPicPr>
-            <a:picLocks noChangeAspect="1"/>
-          </p:cNvPicPr>
-          <p:nvPr/>
-        </p:nvPicPr>
-        <p:blipFill>
-          <a:blip r:embed="rId3"/>
-          <a:stretch>
-            <a:fillRect/>
-          </a:stretch>
-        </p:blipFill>
-        <p:spPr>
-          <a:xfrm>
-            <a:off x="4426352" y="1759352"/>
-            <a:ext cx="3339296" cy="3339296"/>
-          </a:xfrm>
-          <a:prstGeom prst="rect">
-            <a:avLst/>
-          </a:prstGeom>
-        </p:spPr>
-      </p:pic>
+          <p:cNvSpPr>
+            <a:spLocks noGrp="1"/>
+          </p:cNvSpPr>
+          <p:nvPr>
+            <p:ph type="title"/>
+          </p:nvPr>
+        </p:nvSpPr>
+        <p:spPr/>
+        <p:txBody>
+          <a:bodyPr/>
+          <a:lstStyle/>
+          <a:p>
+            <a:r>
+              <a:rPr lang="en-US" dirty="0"/>
+              <a:t>Outline</a:t>
+            </a:r>
+          </a:p>
+        </p:txBody>
+      </p:sp>
+      <p:sp>
+        <p:nvSpPr>
+          <p:cNvPr id="3" name="Content Placeholder 2">
+            <a:extLst>
+              <a:ext uri="{FF2B5EF4-FFF2-40B4-BE49-F238E27FC236}">
+                <a16:creationId xmlns:a16="http://schemas.microsoft.com/office/drawing/2014/main" id="{65426B10-0364-A849-B3A4-1D0DA409155A}"/>
+              </a:ext>
+            </a:extLst>
+          </p:cNvPr>
+          <p:cNvSpPr>
+            <a:spLocks noGrp="1"/>
+          </p:cNvSpPr>
+          <p:nvPr>
+            <p:ph idx="1"/>
+          </p:nvPr>
+        </p:nvSpPr>
+        <p:spPr/>
+        <p:txBody>
+          <a:bodyPr/>
+          <a:lstStyle/>
+          <a:p>
+            <a:r>
+              <a:rPr lang="en-US" dirty="0"/>
+              <a:t>For each of these platforms:</a:t>
+            </a:r>
+          </a:p>
+          <a:p>
+            <a:pPr lvl="1"/>
+            <a:r>
+              <a:rPr lang="en-US" dirty="0"/>
+              <a:t>DNAC</a:t>
+            </a:r>
+          </a:p>
+          <a:p>
+            <a:pPr lvl="1"/>
+            <a:r>
+              <a:rPr lang="en-US" dirty="0" err="1"/>
+              <a:t>Webex</a:t>
+            </a:r>
+            <a:r>
+              <a:rPr lang="en-US" dirty="0"/>
+              <a:t> Teams</a:t>
+            </a:r>
+          </a:p>
+          <a:p>
+            <a:pPr lvl="1"/>
+            <a:r>
+              <a:rPr lang="en-US" dirty="0"/>
+              <a:t>Meraki</a:t>
+            </a:r>
+          </a:p>
+          <a:p>
+            <a:pPr lvl="1"/>
+            <a:r>
+              <a:rPr lang="en-US" dirty="0"/>
+              <a:t>ACI</a:t>
+            </a:r>
+          </a:p>
+          <a:p>
+            <a:r>
+              <a:rPr lang="en-US" dirty="0"/>
+              <a:t>Perform the following tasks:</a:t>
+            </a:r>
+          </a:p>
+          <a:p>
+            <a:pPr lvl="1"/>
+            <a:r>
+              <a:rPr lang="en-US" dirty="0"/>
+              <a:t>Review authentication methodology</a:t>
+            </a:r>
+          </a:p>
+          <a:p>
+            <a:pPr lvl="1"/>
+            <a:r>
+              <a:rPr lang="en-US" dirty="0"/>
+              <a:t>Build Python scripts to authenticate</a:t>
+            </a:r>
+          </a:p>
+          <a:p>
+            <a:pPr lvl="1"/>
+            <a:r>
+              <a:rPr lang="en-US" dirty="0"/>
+              <a:t>Build Python scripts to read/write data</a:t>
+            </a:r>
+          </a:p>
+        </p:txBody>
+      </p:sp>
+      <p:sp>
+        <p:nvSpPr>
+          <p:cNvPr id="4" name="Date Placeholder 3">
+            <a:extLst>
+              <a:ext uri="{FF2B5EF4-FFF2-40B4-BE49-F238E27FC236}">
+                <a16:creationId xmlns:a16="http://schemas.microsoft.com/office/drawing/2014/main" id="{7ECEAF79-F4AC-E94E-9E55-220D0D396924}"/>
+              </a:ext>
+            </a:extLst>
+          </p:cNvPr>
+          <p:cNvSpPr>
+            <a:spLocks noGrp="1"/>
+          </p:cNvSpPr>
+          <p:nvPr>
+            <p:ph type="dt" sz="half" idx="10"/>
+          </p:nvPr>
+        </p:nvSpPr>
+        <p:spPr/>
+        <p:txBody>
+          <a:bodyPr/>
+          <a:lstStyle/>
+          <a:p>
+            <a:r>
+              <a:rPr lang="en-US"/>
+              <a:t>World Wide Technology ©</a:t>
+            </a:r>
+            <a:endParaRPr lang="en-US" dirty="0"/>
+          </a:p>
+        </p:txBody>
+      </p:sp>
+      <p:sp>
+        <p:nvSpPr>
+          <p:cNvPr id="5" name="Slide Number Placeholder 4">
+            <a:extLst>
+              <a:ext uri="{FF2B5EF4-FFF2-40B4-BE49-F238E27FC236}">
+                <a16:creationId xmlns:a16="http://schemas.microsoft.com/office/drawing/2014/main" id="{372DC1A4-CE8B-DB4A-8F86-2508518C35D3}"/>
+              </a:ext>
+            </a:extLst>
+          </p:cNvPr>
+          <p:cNvSpPr>
+            <a:spLocks noGrp="1"/>
+          </p:cNvSpPr>
+          <p:nvPr>
+            <p:ph type="sldNum" sz="quarter" idx="12"/>
+          </p:nvPr>
+        </p:nvSpPr>
+        <p:spPr/>
+        <p:txBody>
+          <a:bodyPr/>
+          <a:lstStyle/>
+          <a:p>
+            <a:fld id="{A44B02FA-DD2D-1844-AE35-8B2EAB0CF4EF}" type="slidenum">
+              <a:rPr lang="en-US" smtClean="0"/>
+              <a:pPr/>
+              <a:t>17</a:t>
+            </a:fld>
+            <a:endParaRPr lang="en-US" dirty="0"/>
+          </a:p>
+        </p:txBody>
+      </p:sp>
     </p:spTree>
     <p:extLst>
       <p:ext uri="{BB962C8B-B14F-4D97-AF65-F5344CB8AC3E}">
-        <p14:creationId xmlns:p14="http://schemas.microsoft.com/office/powerpoint/2010/main" val="3759662578"/>
+        <p14:creationId xmlns:p14="http://schemas.microsoft.com/office/powerpoint/2010/main" val="232106193"/>
       </p:ext>
     </p:extLst>
   </p:cSld>
@@ -6734,10 +7113,174 @@
       </p:grpSpPr>
       <p:sp>
         <p:nvSpPr>
+          <p:cNvPr id="2" name="Title 1">
+            <a:extLst>
+              <a:ext uri="{FF2B5EF4-FFF2-40B4-BE49-F238E27FC236}">
+                <a16:creationId xmlns:a16="http://schemas.microsoft.com/office/drawing/2014/main" id="{9D8D6E4C-FC36-3E4C-9387-96DD20072D9D}"/>
+              </a:ext>
+            </a:extLst>
+          </p:cNvPr>
+          <p:cNvSpPr>
+            <a:spLocks noGrp="1"/>
+          </p:cNvSpPr>
+          <p:nvPr>
+            <p:ph type="ctrTitle"/>
+          </p:nvPr>
+        </p:nvSpPr>
+        <p:spPr>
+          <a:xfrm>
+            <a:off x="1524000" y="914013"/>
+            <a:ext cx="9144000" cy="2387600"/>
+          </a:xfrm>
+        </p:spPr>
+        <p:txBody>
+          <a:bodyPr/>
+          <a:lstStyle/>
+          <a:p>
+            <a:r>
+              <a:rPr lang="en-US" dirty="0"/>
+              <a:t>Part VII</a:t>
+            </a:r>
+          </a:p>
+        </p:txBody>
+      </p:sp>
+      <p:sp>
+        <p:nvSpPr>
+          <p:cNvPr id="3" name="Subtitle 2">
+            <a:extLst>
+              <a:ext uri="{FF2B5EF4-FFF2-40B4-BE49-F238E27FC236}">
+                <a16:creationId xmlns:a16="http://schemas.microsoft.com/office/drawing/2014/main" id="{0451A0DE-9D64-5A48-94B5-5B4E42709819}"/>
+              </a:ext>
+            </a:extLst>
+          </p:cNvPr>
+          <p:cNvSpPr>
+            <a:spLocks noGrp="1"/>
+          </p:cNvSpPr>
+          <p:nvPr>
+            <p:ph type="subTitle" idx="1"/>
+          </p:nvPr>
+        </p:nvSpPr>
+        <p:spPr>
+          <a:xfrm>
+            <a:off x="1524000" y="3393688"/>
+            <a:ext cx="9144000" cy="1655762"/>
+          </a:xfrm>
+        </p:spPr>
+        <p:txBody>
+          <a:bodyPr/>
+          <a:lstStyle/>
+          <a:p>
+            <a:r>
+              <a:rPr lang="en-US" dirty="0"/>
+              <a:t>Quiz, Practice Resources, &amp; References</a:t>
+            </a:r>
+          </a:p>
+        </p:txBody>
+      </p:sp>
+    </p:spTree>
+    <p:extLst>
+      <p:ext uri="{BB962C8B-B14F-4D97-AF65-F5344CB8AC3E}">
+        <p14:creationId xmlns:p14="http://schemas.microsoft.com/office/powerpoint/2010/main" val="3392886013"/>
+      </p:ext>
+    </p:extLst>
+  </p:cSld>
+  <p:clrMapOvr>
+    <a:masterClrMapping/>
+  </p:clrMapOvr>
+  <mc:AlternateContent xmlns:mc="http://schemas.openxmlformats.org/markup-compatibility/2006" xmlns:p14="http://schemas.microsoft.com/office/powerpoint/2010/main">
+    <mc:Choice Requires="p14">
+      <p:transition spd="med" p14:dur="700">
+        <p:fade/>
+      </p:transition>
+    </mc:Choice>
+    <mc:Fallback xmlns="">
+      <p:transition spd="med">
+        <p:fade/>
+      </p:transition>
+    </mc:Fallback>
+  </mc:AlternateContent>
+</p:sld>
+</file>
+
+<file path=ppt/slides/slide19.xml><?xml version="1.0" encoding="utf-8"?>
+<p:sld xmlns:a="http://schemas.openxmlformats.org/drawingml/2006/main" xmlns:r="http://schemas.openxmlformats.org/officeDocument/2006/relationships" xmlns:p="http://schemas.openxmlformats.org/presentationml/2006/main">
+  <p:cSld>
+    <p:spTree>
+      <p:nvGrpSpPr>
+        <p:cNvPr id="1" name=""/>
+        <p:cNvGrpSpPr/>
+        <p:nvPr/>
+      </p:nvGrpSpPr>
+      <p:grpSpPr>
+        <a:xfrm>
+          <a:off x="0" y="0"/>
+          <a:ext cx="0" cy="0"/>
+          <a:chOff x="0" y="0"/>
+          <a:chExt cx="0" cy="0"/>
+        </a:xfrm>
+      </p:grpSpPr>
+      <p:sp>
+        <p:nvSpPr>
+          <p:cNvPr id="2" name="Title 1">
+            <a:extLst>
+              <a:ext uri="{FF2B5EF4-FFF2-40B4-BE49-F238E27FC236}">
+                <a16:creationId xmlns:a16="http://schemas.microsoft.com/office/drawing/2014/main" id="{EB7C4089-1746-624B-8E73-D3DAB8E88CDD}"/>
+              </a:ext>
+            </a:extLst>
+          </p:cNvPr>
+          <p:cNvSpPr>
+            <a:spLocks noGrp="1"/>
+          </p:cNvSpPr>
+          <p:nvPr>
+            <p:ph type="title"/>
+          </p:nvPr>
+        </p:nvSpPr>
+        <p:spPr/>
+        <p:txBody>
+          <a:bodyPr/>
+          <a:lstStyle/>
+          <a:p>
+            <a:r>
+              <a:rPr lang="en-US" dirty="0"/>
+              <a:t>Slide Template</a:t>
+            </a:r>
+          </a:p>
+        </p:txBody>
+      </p:sp>
+      <p:sp>
+        <p:nvSpPr>
+          <p:cNvPr id="3" name="Content Placeholder 2">
+            <a:extLst>
+              <a:ext uri="{FF2B5EF4-FFF2-40B4-BE49-F238E27FC236}">
+                <a16:creationId xmlns:a16="http://schemas.microsoft.com/office/drawing/2014/main" id="{65426B10-0364-A849-B3A4-1D0DA409155A}"/>
+              </a:ext>
+            </a:extLst>
+          </p:cNvPr>
+          <p:cNvSpPr>
+            <a:spLocks noGrp="1"/>
+          </p:cNvSpPr>
+          <p:nvPr>
+            <p:ph idx="1"/>
+          </p:nvPr>
+        </p:nvSpPr>
+        <p:spPr/>
+        <p:txBody>
+          <a:bodyPr/>
+          <a:lstStyle/>
+          <a:p>
+            <a:r>
+              <a:rPr lang="en-US" dirty="0"/>
+              <a:t>Body template</a:t>
+            </a:r>
+          </a:p>
+        </p:txBody>
+      </p:sp>
+      <p:sp>
+        <p:nvSpPr>
           <p:cNvPr id="4" name="Date Placeholder 3">
             <a:extLst>
               <a:ext uri="{FF2B5EF4-FFF2-40B4-BE49-F238E27FC236}">
-                <a16:creationId xmlns:a16="http://schemas.microsoft.com/office/drawing/2014/main" id="{0CD670A9-B06A-3448-BABA-FAD627500859}"/>
+                <a16:creationId xmlns:a16="http://schemas.microsoft.com/office/drawing/2014/main" id="{7ECEAF79-F4AC-E94E-9E55-220D0D396924}"/>
               </a:ext>
             </a:extLst>
           </p:cNvPr>
@@ -6766,7 +7309,7 @@
           <p:cNvPr id="5" name="Slide Number Placeholder 4">
             <a:extLst>
               <a:ext uri="{FF2B5EF4-FFF2-40B4-BE49-F238E27FC236}">
-                <a16:creationId xmlns:a16="http://schemas.microsoft.com/office/drawing/2014/main" id="{119DACAD-17C1-C249-A498-C4A1A1ADD334}"/>
+                <a16:creationId xmlns:a16="http://schemas.microsoft.com/office/drawing/2014/main" id="{372DC1A4-CE8B-DB4A-8F86-2508518C35D3}"/>
               </a:ext>
             </a:extLst>
           </p:cNvPr>
@@ -6785,7 +7328,7 @@
             <a:fld id="{A44B02FA-DD2D-1844-AE35-8B2EAB0CF4EF}" type="slidenum">
               <a:rPr lang="en-US" smtClean="0"/>
               <a:pPr/>
-              <a:t>18</a:t>
+              <a:t>19</a:t>
             </a:fld>
             <a:endParaRPr lang="en-US" dirty="0"/>
           </a:p>
@@ -6794,7 +7337,7 @@
     </p:spTree>
     <p:extLst>
       <p:ext uri="{BB962C8B-B14F-4D97-AF65-F5344CB8AC3E}">
-        <p14:creationId xmlns:p14="http://schemas.microsoft.com/office/powerpoint/2010/main" val="756638364"/>
+        <p14:creationId xmlns:p14="http://schemas.microsoft.com/office/powerpoint/2010/main" val="2709408928"/>
       </p:ext>
     </p:extLst>
   </p:cSld>
@@ -7677,6 +8220,312 @@
 </p:sld>
 </file>
 
+<file path=ppt/slides/slide20.xml><?xml version="1.0" encoding="utf-8"?>
+<p:sld xmlns:a="http://schemas.openxmlformats.org/drawingml/2006/main" xmlns:r="http://schemas.openxmlformats.org/officeDocument/2006/relationships" xmlns:p="http://schemas.openxmlformats.org/presentationml/2006/main">
+  <p:cSld>
+    <p:spTree>
+      <p:nvGrpSpPr>
+        <p:cNvPr id="1" name=""/>
+        <p:cNvGrpSpPr/>
+        <p:nvPr/>
+      </p:nvGrpSpPr>
+      <p:grpSpPr>
+        <a:xfrm>
+          <a:off x="0" y="0"/>
+          <a:ext cx="0" cy="0"/>
+          <a:chOff x="0" y="0"/>
+          <a:chExt cx="0" cy="0"/>
+        </a:xfrm>
+      </p:grpSpPr>
+      <p:sp>
+        <p:nvSpPr>
+          <p:cNvPr id="2" name="Title 1">
+            <a:extLst>
+              <a:ext uri="{FF2B5EF4-FFF2-40B4-BE49-F238E27FC236}">
+                <a16:creationId xmlns:a16="http://schemas.microsoft.com/office/drawing/2014/main" id="{EB7C4089-1746-624B-8E73-D3DAB8E88CDD}"/>
+              </a:ext>
+            </a:extLst>
+          </p:cNvPr>
+          <p:cNvSpPr>
+            <a:spLocks noGrp="1"/>
+          </p:cNvSpPr>
+          <p:nvPr>
+            <p:ph type="title"/>
+          </p:nvPr>
+        </p:nvSpPr>
+        <p:spPr/>
+        <p:txBody>
+          <a:bodyPr/>
+          <a:lstStyle/>
+          <a:p>
+            <a:r>
+              <a:rPr lang="en-US" dirty="0"/>
+              <a:t>References</a:t>
+            </a:r>
+          </a:p>
+        </p:txBody>
+      </p:sp>
+      <p:sp>
+        <p:nvSpPr>
+          <p:cNvPr id="3" name="Content Placeholder 2">
+            <a:extLst>
+              <a:ext uri="{FF2B5EF4-FFF2-40B4-BE49-F238E27FC236}">
+                <a16:creationId xmlns:a16="http://schemas.microsoft.com/office/drawing/2014/main" id="{65426B10-0364-A849-B3A4-1D0DA409155A}"/>
+              </a:ext>
+            </a:extLst>
+          </p:cNvPr>
+          <p:cNvSpPr>
+            <a:spLocks noGrp="1"/>
+          </p:cNvSpPr>
+          <p:nvPr>
+            <p:ph idx="1"/>
+          </p:nvPr>
+        </p:nvSpPr>
+        <p:spPr/>
+        <p:txBody>
+          <a:bodyPr/>
+          <a:lstStyle/>
+          <a:p>
+            <a:r>
+              <a:rPr lang="en-US" dirty="0">
+                <a:hlinkClick r:id="rId2"/>
+              </a:rPr>
+              <a:t>https://en.wikipedia.org/wiki/CURL</a:t>
+            </a:r>
+            <a:endParaRPr lang="en-US" dirty="0"/>
+          </a:p>
+          <a:p>
+            <a:r>
+              <a:rPr lang="en-US" dirty="0">
+                <a:hlinkClick r:id="rId3"/>
+              </a:rPr>
+              <a:t>https://en.wikipedia.org/wiki/Requests_%28software%29</a:t>
+            </a:r>
+            <a:endParaRPr lang="en-US" dirty="0"/>
+          </a:p>
+          <a:p>
+            <a:r>
+              <a:rPr lang="en-US" dirty="0">
+                <a:hlinkClick r:id="rId4"/>
+              </a:rPr>
+              <a:t>https://curl.haxx.se</a:t>
+            </a:r>
+            <a:endParaRPr lang="en-US" dirty="0"/>
+          </a:p>
+          <a:p>
+            <a:r>
+              <a:rPr lang="en-US" dirty="0">
+                <a:hlinkClick r:id="rId5"/>
+              </a:rPr>
+              <a:t>https://requests.readthedocs.io/en/master/</a:t>
+            </a:r>
+            <a:endParaRPr lang="en-US" dirty="0"/>
+          </a:p>
+          <a:p>
+            <a:r>
+              <a:rPr lang="en-US" dirty="0"/>
+              <a:t>Cisco API documentation #1</a:t>
+            </a:r>
+          </a:p>
+          <a:p>
+            <a:r>
+              <a:rPr lang="en-US" dirty="0"/>
+              <a:t>Cisco API documentation #2</a:t>
+            </a:r>
+          </a:p>
+          <a:p>
+            <a:r>
+              <a:rPr lang="en-US" dirty="0"/>
+              <a:t>Cisco API documentation #3</a:t>
+            </a:r>
+          </a:p>
+        </p:txBody>
+      </p:sp>
+      <p:sp>
+        <p:nvSpPr>
+          <p:cNvPr id="4" name="Date Placeholder 3">
+            <a:extLst>
+              <a:ext uri="{FF2B5EF4-FFF2-40B4-BE49-F238E27FC236}">
+                <a16:creationId xmlns:a16="http://schemas.microsoft.com/office/drawing/2014/main" id="{7ECEAF79-F4AC-E94E-9E55-220D0D396924}"/>
+              </a:ext>
+            </a:extLst>
+          </p:cNvPr>
+          <p:cNvSpPr>
+            <a:spLocks noGrp="1"/>
+          </p:cNvSpPr>
+          <p:nvPr>
+            <p:ph type="dt" sz="half" idx="10"/>
+          </p:nvPr>
+        </p:nvSpPr>
+        <p:spPr/>
+        <p:txBody>
+          <a:bodyPr/>
+          <a:lstStyle/>
+          <a:p>
+            <a:r>
+              <a:rPr lang="en-US"/>
+              <a:t>World Wide Technology ©</a:t>
+            </a:r>
+            <a:endParaRPr lang="en-US" dirty="0"/>
+          </a:p>
+        </p:txBody>
+      </p:sp>
+      <p:sp>
+        <p:nvSpPr>
+          <p:cNvPr id="5" name="Slide Number Placeholder 4">
+            <a:extLst>
+              <a:ext uri="{FF2B5EF4-FFF2-40B4-BE49-F238E27FC236}">
+                <a16:creationId xmlns:a16="http://schemas.microsoft.com/office/drawing/2014/main" id="{372DC1A4-CE8B-DB4A-8F86-2508518C35D3}"/>
+              </a:ext>
+            </a:extLst>
+          </p:cNvPr>
+          <p:cNvSpPr>
+            <a:spLocks noGrp="1"/>
+          </p:cNvSpPr>
+          <p:nvPr>
+            <p:ph type="sldNum" sz="quarter" idx="12"/>
+          </p:nvPr>
+        </p:nvSpPr>
+        <p:spPr/>
+        <p:txBody>
+          <a:bodyPr/>
+          <a:lstStyle/>
+          <a:p>
+            <a:fld id="{A44B02FA-DD2D-1844-AE35-8B2EAB0CF4EF}" type="slidenum">
+              <a:rPr lang="en-US" smtClean="0"/>
+              <a:pPr/>
+              <a:t>20</a:t>
+            </a:fld>
+            <a:endParaRPr lang="en-US" dirty="0"/>
+          </a:p>
+        </p:txBody>
+      </p:sp>
+    </p:spTree>
+    <p:extLst>
+      <p:ext uri="{BB962C8B-B14F-4D97-AF65-F5344CB8AC3E}">
+        <p14:creationId xmlns:p14="http://schemas.microsoft.com/office/powerpoint/2010/main" val="3225595977"/>
+      </p:ext>
+    </p:extLst>
+  </p:cSld>
+  <p:clrMapOvr>
+    <a:masterClrMapping/>
+  </p:clrMapOvr>
+  <mc:AlternateContent xmlns:mc="http://schemas.openxmlformats.org/markup-compatibility/2006" xmlns:p14="http://schemas.microsoft.com/office/powerpoint/2010/main">
+    <mc:Choice Requires="p14">
+      <p:transition spd="med" p14:dur="700">
+        <p:fade/>
+      </p:transition>
+    </mc:Choice>
+    <mc:Fallback xmlns="">
+      <p:transition spd="med">
+        <p:fade/>
+      </p:transition>
+    </mc:Fallback>
+  </mc:AlternateContent>
+</p:sld>
+</file>
+
+<file path=ppt/slides/slide21.xml><?xml version="1.0" encoding="utf-8"?>
+<p:sld xmlns:a="http://schemas.openxmlformats.org/drawingml/2006/main" xmlns:r="http://schemas.openxmlformats.org/officeDocument/2006/relationships" xmlns:p="http://schemas.openxmlformats.org/presentationml/2006/main">
+  <p:cSld>
+    <p:spTree>
+      <p:nvGrpSpPr>
+        <p:cNvPr id="1" name=""/>
+        <p:cNvGrpSpPr/>
+        <p:nvPr/>
+      </p:nvGrpSpPr>
+      <p:grpSpPr>
+        <a:xfrm>
+          <a:off x="0" y="0"/>
+          <a:ext cx="0" cy="0"/>
+          <a:chOff x="0" y="0"/>
+          <a:chExt cx="0" cy="0"/>
+        </a:xfrm>
+      </p:grpSpPr>
+      <p:sp>
+        <p:nvSpPr>
+          <p:cNvPr id="4" name="Date Placeholder 3">
+            <a:extLst>
+              <a:ext uri="{FF2B5EF4-FFF2-40B4-BE49-F238E27FC236}">
+                <a16:creationId xmlns:a16="http://schemas.microsoft.com/office/drawing/2014/main" id="{0CD670A9-B06A-3448-BABA-FAD627500859}"/>
+              </a:ext>
+            </a:extLst>
+          </p:cNvPr>
+          <p:cNvSpPr>
+            <a:spLocks noGrp="1"/>
+          </p:cNvSpPr>
+          <p:nvPr>
+            <p:ph type="dt" sz="half" idx="10"/>
+          </p:nvPr>
+        </p:nvSpPr>
+        <p:spPr/>
+        <p:txBody>
+          <a:bodyPr/>
+          <a:lstStyle/>
+          <a:p>
+            <a:r>
+              <a:rPr lang="en-US"/>
+              <a:t>World Wide Technology ©</a:t>
+            </a:r>
+            <a:endParaRPr lang="en-US" dirty="0"/>
+          </a:p>
+        </p:txBody>
+      </p:sp>
+      <p:sp>
+        <p:nvSpPr>
+          <p:cNvPr id="5" name="Slide Number Placeholder 4">
+            <a:extLst>
+              <a:ext uri="{FF2B5EF4-FFF2-40B4-BE49-F238E27FC236}">
+                <a16:creationId xmlns:a16="http://schemas.microsoft.com/office/drawing/2014/main" id="{119DACAD-17C1-C249-A498-C4A1A1ADD334}"/>
+              </a:ext>
+            </a:extLst>
+          </p:cNvPr>
+          <p:cNvSpPr>
+            <a:spLocks noGrp="1"/>
+          </p:cNvSpPr>
+          <p:nvPr>
+            <p:ph type="sldNum" sz="quarter" idx="12"/>
+          </p:nvPr>
+        </p:nvSpPr>
+        <p:spPr/>
+        <p:txBody>
+          <a:bodyPr/>
+          <a:lstStyle/>
+          <a:p>
+            <a:fld id="{A44B02FA-DD2D-1844-AE35-8B2EAB0CF4EF}" type="slidenum">
+              <a:rPr lang="en-US" smtClean="0"/>
+              <a:pPr/>
+              <a:t>21</a:t>
+            </a:fld>
+            <a:endParaRPr lang="en-US" dirty="0"/>
+          </a:p>
+        </p:txBody>
+      </p:sp>
+    </p:spTree>
+    <p:extLst>
+      <p:ext uri="{BB962C8B-B14F-4D97-AF65-F5344CB8AC3E}">
+        <p14:creationId xmlns:p14="http://schemas.microsoft.com/office/powerpoint/2010/main" val="756638364"/>
+      </p:ext>
+    </p:extLst>
+  </p:cSld>
+  <p:clrMapOvr>
+    <a:masterClrMapping/>
+  </p:clrMapOvr>
+  <mc:AlternateContent xmlns:mc="http://schemas.openxmlformats.org/markup-compatibility/2006" xmlns:p14="http://schemas.microsoft.com/office/powerpoint/2010/main">
+    <mc:Choice Requires="p14">
+      <p:transition spd="med" p14:dur="700">
+        <p:fade/>
+      </p:transition>
+    </mc:Choice>
+    <mc:Fallback xmlns="">
+      <p:transition spd="med">
+        <p:fade/>
+      </p:transition>
+    </mc:Fallback>
+  </mc:AlternateContent>
+</p:sld>
+</file>
+
 <file path=ppt/slides/slide3.xml><?xml version="1.0" encoding="utf-8"?>
 <p:sld xmlns:a="http://schemas.openxmlformats.org/drawingml/2006/main" xmlns:r="http://schemas.openxmlformats.org/officeDocument/2006/relationships" xmlns:p="http://schemas.openxmlformats.org/presentationml/2006/main">
   <p:cSld>
@@ -8141,6 +8990,36 @@
           </a:p>
         </p:txBody>
       </p:sp>
+      <p:pic>
+        <p:nvPicPr>
+          <p:cNvPr id="7" name="Picture 6" descr="A close up of a sign&#10;&#10;Description automatically generated">
+            <a:extLst>
+              <a:ext uri="{FF2B5EF4-FFF2-40B4-BE49-F238E27FC236}">
+                <a16:creationId xmlns:a16="http://schemas.microsoft.com/office/drawing/2014/main" id="{26F43F39-EACF-0745-93AC-CBF0EF4BF4CA}"/>
+              </a:ext>
+            </a:extLst>
+          </p:cNvPr>
+          <p:cNvPicPr>
+            <a:picLocks noChangeAspect="1"/>
+          </p:cNvPicPr>
+          <p:nvPr/>
+        </p:nvPicPr>
+        <p:blipFill>
+          <a:blip r:embed="rId3"/>
+          <a:stretch>
+            <a:fillRect/>
+          </a:stretch>
+        </p:blipFill>
+        <p:spPr>
+          <a:xfrm rot="870868">
+            <a:off x="4407451" y="780407"/>
+            <a:ext cx="3377096" cy="5297184"/>
+          </a:xfrm>
+          <a:prstGeom prst="rect">
+            <a:avLst/>
+          </a:prstGeom>
+        </p:spPr>
+      </p:pic>
     </p:spTree>
     <p:extLst>
       <p:ext uri="{BB962C8B-B14F-4D97-AF65-F5344CB8AC3E}">
@@ -8407,6 +9286,97 @@
                       </p:childTnLst>
                     </p:cTn>
                   </p:par>
+                  <p:par>
+                    <p:cTn id="23" fill="hold">
+                      <p:stCondLst>
+                        <p:cond delay="indefinite"/>
+                      </p:stCondLst>
+                      <p:childTnLst>
+                        <p:par>
+                          <p:cTn id="24" fill="hold">
+                            <p:stCondLst>
+                              <p:cond delay="0"/>
+                            </p:stCondLst>
+                            <p:childTnLst>
+                              <p:par>
+                                <p:cTn id="25" presetID="23" presetClass="entr" presetSubtype="32" fill="hold" nodeType="clickEffect">
+                                  <p:stCondLst>
+                                    <p:cond delay="0"/>
+                                  </p:stCondLst>
+                                  <p:childTnLst>
+                                    <p:set>
+                                      <p:cBhvr>
+                                        <p:cTn id="26" dur="1" fill="hold">
+                                          <p:stCondLst>
+                                            <p:cond delay="0"/>
+                                          </p:stCondLst>
+                                        </p:cTn>
+                                        <p:tgtEl>
+                                          <p:spTgt spid="7"/>
+                                        </p:tgtEl>
+                                        <p:attrNameLst>
+                                          <p:attrName>style.visibility</p:attrName>
+                                        </p:attrNameLst>
+                                      </p:cBhvr>
+                                      <p:to>
+                                        <p:strVal val="visible"/>
+                                      </p:to>
+                                    </p:set>
+                                    <p:anim calcmode="lin" valueType="num">
+                                      <p:cBhvr>
+                                        <p:cTn id="27" dur="500" fill="hold"/>
+                                        <p:tgtEl>
+                                          <p:spTgt spid="7"/>
+                                        </p:tgtEl>
+                                        <p:attrNameLst>
+                                          <p:attrName>ppt_w</p:attrName>
+                                        </p:attrNameLst>
+                                      </p:cBhvr>
+                                      <p:tavLst>
+                                        <p:tav tm="0">
+                                          <p:val>
+                                            <p:strVal val="4*#ppt_w"/>
+                                          </p:val>
+                                        </p:tav>
+                                        <p:tav tm="100000">
+                                          <p:val>
+                                            <p:strVal val="#ppt_w"/>
+                                          </p:val>
+                                        </p:tav>
+                                      </p:tavLst>
+                                    </p:anim>
+                                    <p:anim calcmode="lin" valueType="num">
+                                      <p:cBhvr>
+                                        <p:cTn id="28" dur="500" fill="hold"/>
+                                        <p:tgtEl>
+                                          <p:spTgt spid="7"/>
+                                        </p:tgtEl>
+                                        <p:attrNameLst>
+                                          <p:attrName>ppt_h</p:attrName>
+                                        </p:attrNameLst>
+                                      </p:cBhvr>
+                                      <p:tavLst>
+                                        <p:tav tm="0">
+                                          <p:val>
+                                            <p:strVal val="4*#ppt_h"/>
+                                          </p:val>
+                                        </p:tav>
+                                        <p:tav tm="100000">
+                                          <p:val>
+                                            <p:strVal val="#ppt_h"/>
+                                          </p:val>
+                                        </p:tav>
+                                      </p:tavLst>
+                                    </p:anim>
+                                  </p:childTnLst>
+                                </p:cTn>
+                              </p:par>
+                            </p:childTnLst>
+                          </p:cTn>
+                        </p:par>
+                      </p:childTnLst>
+                    </p:cTn>
+                  </p:par>
                 </p:childTnLst>
               </p:cTn>
               <p:prevCondLst>
@@ -8437,6 +9407,119 @@
 </file>
 
 <file path=ppt/slides/slide5.xml><?xml version="1.0" encoding="utf-8"?>
+<p:sld xmlns:a="http://schemas.openxmlformats.org/drawingml/2006/main" xmlns:r="http://schemas.openxmlformats.org/officeDocument/2006/relationships" xmlns:p="http://schemas.openxmlformats.org/presentationml/2006/main">
+  <p:cSld>
+    <p:spTree>
+      <p:nvGrpSpPr>
+        <p:cNvPr id="1" name=""/>
+        <p:cNvGrpSpPr/>
+        <p:nvPr/>
+      </p:nvGrpSpPr>
+      <p:grpSpPr>
+        <a:xfrm>
+          <a:off x="0" y="0"/>
+          <a:ext cx="0" cy="0"/>
+          <a:chOff x="0" y="0"/>
+          <a:chExt cx="0" cy="0"/>
+        </a:xfrm>
+      </p:grpSpPr>
+      <p:sp>
+        <p:nvSpPr>
+          <p:cNvPr id="2" name="Title 1">
+            <a:extLst>
+              <a:ext uri="{FF2B5EF4-FFF2-40B4-BE49-F238E27FC236}">
+                <a16:creationId xmlns:a16="http://schemas.microsoft.com/office/drawing/2014/main" id="{9D8D6E4C-FC36-3E4C-9387-96DD20072D9D}"/>
+              </a:ext>
+            </a:extLst>
+          </p:cNvPr>
+          <p:cNvSpPr>
+            <a:spLocks noGrp="1"/>
+          </p:cNvSpPr>
+          <p:nvPr>
+            <p:ph type="ctrTitle"/>
+          </p:nvPr>
+        </p:nvSpPr>
+        <p:spPr>
+          <a:xfrm>
+            <a:off x="1524000" y="914013"/>
+            <a:ext cx="9144000" cy="2387600"/>
+          </a:xfrm>
+        </p:spPr>
+        <p:txBody>
+          <a:bodyPr/>
+          <a:lstStyle/>
+          <a:p>
+            <a:r>
+              <a:rPr lang="en-US" dirty="0"/>
+              <a:t>Part II</a:t>
+            </a:r>
+          </a:p>
+        </p:txBody>
+      </p:sp>
+      <p:sp>
+        <p:nvSpPr>
+          <p:cNvPr id="3" name="Subtitle 2">
+            <a:extLst>
+              <a:ext uri="{FF2B5EF4-FFF2-40B4-BE49-F238E27FC236}">
+                <a16:creationId xmlns:a16="http://schemas.microsoft.com/office/drawing/2014/main" id="{0451A0DE-9D64-5A48-94B5-5B4E42709819}"/>
+              </a:ext>
+            </a:extLst>
+          </p:cNvPr>
+          <p:cNvSpPr>
+            <a:spLocks noGrp="1"/>
+          </p:cNvSpPr>
+          <p:nvPr>
+            <p:ph type="subTitle" idx="1"/>
+          </p:nvPr>
+        </p:nvSpPr>
+        <p:spPr>
+          <a:xfrm>
+            <a:off x="1524000" y="3393688"/>
+            <a:ext cx="9144000" cy="1655762"/>
+          </a:xfrm>
+        </p:spPr>
+        <p:txBody>
+          <a:bodyPr/>
+          <a:lstStyle/>
+          <a:p>
+            <a:r>
+              <a:rPr lang="en-US" dirty="0"/>
+              <a:t>REST API Calls With </a:t>
+            </a:r>
+            <a:r>
+              <a:rPr lang="en-US" dirty="0" err="1"/>
+              <a:t>cURL</a:t>
+            </a:r>
+            <a:endParaRPr lang="en-US" dirty="0"/>
+          </a:p>
+        </p:txBody>
+      </p:sp>
+    </p:spTree>
+    <p:extLst>
+      <p:ext uri="{BB962C8B-B14F-4D97-AF65-F5344CB8AC3E}">
+        <p14:creationId xmlns:p14="http://schemas.microsoft.com/office/powerpoint/2010/main" val="3846466957"/>
+      </p:ext>
+    </p:extLst>
+  </p:cSld>
+  <p:clrMapOvr>
+    <a:masterClrMapping/>
+  </p:clrMapOvr>
+  <mc:AlternateContent xmlns:mc="http://schemas.openxmlformats.org/markup-compatibility/2006" xmlns:p14="http://schemas.microsoft.com/office/powerpoint/2010/main">
+    <mc:Choice Requires="p14">
+      <p:transition spd="med" p14:dur="700">
+        <p:fade/>
+      </p:transition>
+    </mc:Choice>
+    <mc:Fallback xmlns="">
+      <p:transition spd="med">
+        <p:fade/>
+      </p:transition>
+    </mc:Fallback>
+  </mc:AlternateContent>
+</p:sld>
+</file>
+
+<file path=ppt/slides/slide6.xml><?xml version="1.0" encoding="utf-8"?>
 <p:sld xmlns:a="http://schemas.openxmlformats.org/drawingml/2006/main" xmlns:r="http://schemas.openxmlformats.org/officeDocument/2006/relationships" xmlns:p="http://schemas.openxmlformats.org/presentationml/2006/main">
   <p:cSld>
     <p:spTree>
@@ -8759,7 +9842,7 @@
             </a:r>
             <a:r>
               <a:rPr lang="en-US" dirty="0"/>
-              <a:t> allows us to make REST API calls from our terminal</a:t>
+              <a:t> allows us to make REST API calls from a terminal</a:t>
             </a:r>
           </a:p>
         </p:txBody>
@@ -8817,7 +9900,7 @@
             <a:fld id="{A44B02FA-DD2D-1844-AE35-8B2EAB0CF4EF}" type="slidenum">
               <a:rPr lang="en-US" smtClean="0"/>
               <a:pPr/>
-              <a:t>5</a:t>
+              <a:t>6</a:t>
             </a:fld>
             <a:endParaRPr lang="en-US" dirty="0"/>
           </a:p>
@@ -8988,7 +10071,298 @@
 </p:sld>
 </file>
 
-<file path=ppt/slides/slide6.xml><?xml version="1.0" encoding="utf-8"?>
+<file path=ppt/slides/slide7.xml><?xml version="1.0" encoding="utf-8"?>
+<p:sld xmlns:a="http://schemas.openxmlformats.org/drawingml/2006/main" xmlns:r="http://schemas.openxmlformats.org/officeDocument/2006/relationships" xmlns:p="http://schemas.openxmlformats.org/presentationml/2006/main">
+  <p:cSld>
+    <p:spTree>
+      <p:nvGrpSpPr>
+        <p:cNvPr id="1" name=""/>
+        <p:cNvGrpSpPr/>
+        <p:nvPr/>
+      </p:nvGrpSpPr>
+      <p:grpSpPr>
+        <a:xfrm>
+          <a:off x="0" y="0"/>
+          <a:ext cx="0" cy="0"/>
+          <a:chOff x="0" y="0"/>
+          <a:chExt cx="0" cy="0"/>
+        </a:xfrm>
+      </p:grpSpPr>
+      <p:sp>
+        <p:nvSpPr>
+          <p:cNvPr id="2" name="Title 1">
+            <a:extLst>
+              <a:ext uri="{FF2B5EF4-FFF2-40B4-BE49-F238E27FC236}">
+                <a16:creationId xmlns:a16="http://schemas.microsoft.com/office/drawing/2014/main" id="{EB7C4089-1746-624B-8E73-D3DAB8E88CDD}"/>
+              </a:ext>
+            </a:extLst>
+          </p:cNvPr>
+          <p:cNvSpPr>
+            <a:spLocks noGrp="1"/>
+          </p:cNvSpPr>
+          <p:nvPr>
+            <p:ph type="title"/>
+          </p:nvPr>
+        </p:nvSpPr>
+        <p:spPr/>
+        <p:txBody>
+          <a:bodyPr/>
+          <a:lstStyle/>
+          <a:p>
+            <a:r>
+              <a:rPr lang="en-US" dirty="0"/>
+              <a:t>Outline</a:t>
+            </a:r>
+          </a:p>
+        </p:txBody>
+      </p:sp>
+      <p:sp>
+        <p:nvSpPr>
+          <p:cNvPr id="3" name="Content Placeholder 2">
+            <a:extLst>
+              <a:ext uri="{FF2B5EF4-FFF2-40B4-BE49-F238E27FC236}">
+                <a16:creationId xmlns:a16="http://schemas.microsoft.com/office/drawing/2014/main" id="{65426B10-0364-A849-B3A4-1D0DA409155A}"/>
+              </a:ext>
+            </a:extLst>
+          </p:cNvPr>
+          <p:cNvSpPr>
+            <a:spLocks noGrp="1"/>
+          </p:cNvSpPr>
+          <p:nvPr>
+            <p:ph idx="1"/>
+          </p:nvPr>
+        </p:nvSpPr>
+        <p:spPr/>
+        <p:txBody>
+          <a:bodyPr>
+            <a:normAutofit/>
+          </a:bodyPr>
+          <a:lstStyle/>
+          <a:p>
+            <a:r>
+              <a:rPr lang="en-US" dirty="0"/>
+              <a:t>Syntax format</a:t>
+            </a:r>
+          </a:p>
+          <a:p>
+            <a:r>
+              <a:rPr lang="en-US" dirty="0" err="1"/>
+              <a:t>cURL</a:t>
+            </a:r>
+            <a:r>
+              <a:rPr lang="en-US" dirty="0"/>
+              <a:t> command flag definitions</a:t>
+            </a:r>
+          </a:p>
+          <a:p>
+            <a:r>
+              <a:rPr lang="en-US" dirty="0"/>
+              <a:t>Basic </a:t>
+            </a:r>
+            <a:r>
+              <a:rPr lang="en-US" dirty="0" err="1"/>
+              <a:t>cURL</a:t>
+            </a:r>
+            <a:r>
+              <a:rPr lang="en-US" dirty="0"/>
+              <a:t> examples and exercises</a:t>
+            </a:r>
+          </a:p>
+        </p:txBody>
+      </p:sp>
+      <p:sp>
+        <p:nvSpPr>
+          <p:cNvPr id="4" name="Date Placeholder 3">
+            <a:extLst>
+              <a:ext uri="{FF2B5EF4-FFF2-40B4-BE49-F238E27FC236}">
+                <a16:creationId xmlns:a16="http://schemas.microsoft.com/office/drawing/2014/main" id="{7ECEAF79-F4AC-E94E-9E55-220D0D396924}"/>
+              </a:ext>
+            </a:extLst>
+          </p:cNvPr>
+          <p:cNvSpPr>
+            <a:spLocks noGrp="1"/>
+          </p:cNvSpPr>
+          <p:nvPr>
+            <p:ph type="dt" sz="half" idx="10"/>
+          </p:nvPr>
+        </p:nvSpPr>
+        <p:spPr/>
+        <p:txBody>
+          <a:bodyPr/>
+          <a:lstStyle/>
+          <a:p>
+            <a:r>
+              <a:rPr lang="en-US"/>
+              <a:t>World Wide Technology ©</a:t>
+            </a:r>
+            <a:endParaRPr lang="en-US" dirty="0"/>
+          </a:p>
+        </p:txBody>
+      </p:sp>
+      <p:sp>
+        <p:nvSpPr>
+          <p:cNvPr id="5" name="Slide Number Placeholder 4">
+            <a:extLst>
+              <a:ext uri="{FF2B5EF4-FFF2-40B4-BE49-F238E27FC236}">
+                <a16:creationId xmlns:a16="http://schemas.microsoft.com/office/drawing/2014/main" id="{372DC1A4-CE8B-DB4A-8F86-2508518C35D3}"/>
+              </a:ext>
+            </a:extLst>
+          </p:cNvPr>
+          <p:cNvSpPr>
+            <a:spLocks noGrp="1"/>
+          </p:cNvSpPr>
+          <p:nvPr>
+            <p:ph type="sldNum" sz="quarter" idx="12"/>
+          </p:nvPr>
+        </p:nvSpPr>
+        <p:spPr/>
+        <p:txBody>
+          <a:bodyPr/>
+          <a:lstStyle/>
+          <a:p>
+            <a:fld id="{A44B02FA-DD2D-1844-AE35-8B2EAB0CF4EF}" type="slidenum">
+              <a:rPr lang="en-US" smtClean="0"/>
+              <a:pPr/>
+              <a:t>7</a:t>
+            </a:fld>
+            <a:endParaRPr lang="en-US" dirty="0"/>
+          </a:p>
+        </p:txBody>
+      </p:sp>
+    </p:spTree>
+    <p:extLst>
+      <p:ext uri="{BB962C8B-B14F-4D97-AF65-F5344CB8AC3E}">
+        <p14:creationId xmlns:p14="http://schemas.microsoft.com/office/powerpoint/2010/main" val="1440297303"/>
+      </p:ext>
+    </p:extLst>
+  </p:cSld>
+  <p:clrMapOvr>
+    <a:masterClrMapping/>
+  </p:clrMapOvr>
+  <mc:AlternateContent xmlns:mc="http://schemas.openxmlformats.org/markup-compatibility/2006" xmlns:p14="http://schemas.microsoft.com/office/powerpoint/2010/main">
+    <mc:Choice Requires="p14">
+      <p:transition spd="med" p14:dur="700">
+        <p:fade/>
+      </p:transition>
+    </mc:Choice>
+    <mc:Fallback xmlns="">
+      <p:transition spd="med">
+        <p:fade/>
+      </p:transition>
+    </mc:Fallback>
+  </mc:AlternateContent>
+</p:sld>
+</file>
+
+<file path=ppt/slides/slide8.xml><?xml version="1.0" encoding="utf-8"?>
+<p:sld xmlns:a="http://schemas.openxmlformats.org/drawingml/2006/main" xmlns:r="http://schemas.openxmlformats.org/officeDocument/2006/relationships" xmlns:p="http://schemas.openxmlformats.org/presentationml/2006/main">
+  <p:cSld>
+    <p:spTree>
+      <p:nvGrpSpPr>
+        <p:cNvPr id="1" name=""/>
+        <p:cNvGrpSpPr/>
+        <p:nvPr/>
+      </p:nvGrpSpPr>
+      <p:grpSpPr>
+        <a:xfrm>
+          <a:off x="0" y="0"/>
+          <a:ext cx="0" cy="0"/>
+          <a:chOff x="0" y="0"/>
+          <a:chExt cx="0" cy="0"/>
+        </a:xfrm>
+      </p:grpSpPr>
+      <p:sp>
+        <p:nvSpPr>
+          <p:cNvPr id="2" name="Title 1">
+            <a:extLst>
+              <a:ext uri="{FF2B5EF4-FFF2-40B4-BE49-F238E27FC236}">
+                <a16:creationId xmlns:a16="http://schemas.microsoft.com/office/drawing/2014/main" id="{9D8D6E4C-FC36-3E4C-9387-96DD20072D9D}"/>
+              </a:ext>
+            </a:extLst>
+          </p:cNvPr>
+          <p:cNvSpPr>
+            <a:spLocks noGrp="1"/>
+          </p:cNvSpPr>
+          <p:nvPr>
+            <p:ph type="ctrTitle"/>
+          </p:nvPr>
+        </p:nvSpPr>
+        <p:spPr>
+          <a:xfrm>
+            <a:off x="1524000" y="914013"/>
+            <a:ext cx="9144000" cy="2387600"/>
+          </a:xfrm>
+        </p:spPr>
+        <p:txBody>
+          <a:bodyPr/>
+          <a:lstStyle/>
+          <a:p>
+            <a:r>
+              <a:rPr lang="en-US" dirty="0"/>
+              <a:t>Part III</a:t>
+            </a:r>
+          </a:p>
+        </p:txBody>
+      </p:sp>
+      <p:sp>
+        <p:nvSpPr>
+          <p:cNvPr id="3" name="Subtitle 2">
+            <a:extLst>
+              <a:ext uri="{FF2B5EF4-FFF2-40B4-BE49-F238E27FC236}">
+                <a16:creationId xmlns:a16="http://schemas.microsoft.com/office/drawing/2014/main" id="{0451A0DE-9D64-5A48-94B5-5B4E42709819}"/>
+              </a:ext>
+            </a:extLst>
+          </p:cNvPr>
+          <p:cNvSpPr>
+            <a:spLocks noGrp="1"/>
+          </p:cNvSpPr>
+          <p:nvPr>
+            <p:ph type="subTitle" idx="1"/>
+          </p:nvPr>
+        </p:nvSpPr>
+        <p:spPr>
+          <a:xfrm>
+            <a:off x="1524000" y="3393688"/>
+            <a:ext cx="9144000" cy="1655762"/>
+          </a:xfrm>
+        </p:spPr>
+        <p:txBody>
+          <a:bodyPr/>
+          <a:lstStyle/>
+          <a:p>
+            <a:r>
+              <a:rPr lang="en-US" dirty="0"/>
+              <a:t>REST API Calls With Python Requests</a:t>
+            </a:r>
+          </a:p>
+        </p:txBody>
+      </p:sp>
+    </p:spTree>
+    <p:extLst>
+      <p:ext uri="{BB962C8B-B14F-4D97-AF65-F5344CB8AC3E}">
+        <p14:creationId xmlns:p14="http://schemas.microsoft.com/office/powerpoint/2010/main" val="2611764585"/>
+      </p:ext>
+    </p:extLst>
+  </p:cSld>
+  <p:clrMapOvr>
+    <a:masterClrMapping/>
+  </p:clrMapOvr>
+  <mc:AlternateContent xmlns:mc="http://schemas.openxmlformats.org/markup-compatibility/2006" xmlns:p14="http://schemas.microsoft.com/office/powerpoint/2010/main">
+    <mc:Choice Requires="p14">
+      <p:transition spd="med" p14:dur="700">
+        <p:fade/>
+      </p:transition>
+    </mc:Choice>
+    <mc:Fallback xmlns="">
+      <p:transition spd="med">
+        <p:fade/>
+      </p:transition>
+    </mc:Fallback>
+  </mc:AlternateContent>
+</p:sld>
+</file>
+
+<file path=ppt/slides/slide9.xml><?xml version="1.0" encoding="utf-8"?>
 <p:sld xmlns:a="http://schemas.openxmlformats.org/drawingml/2006/main" xmlns:r="http://schemas.openxmlformats.org/officeDocument/2006/relationships" xmlns:p="http://schemas.openxmlformats.org/presentationml/2006/main">
   <p:cSld>
     <p:spTree>
@@ -9345,7 +10719,7 @@
             <a:fld id="{A44B02FA-DD2D-1844-AE35-8B2EAB0CF4EF}" type="slidenum">
               <a:rPr lang="en-US" smtClean="0"/>
               <a:pPr/>
-              <a:t>6</a:t>
+              <a:t>9</a:t>
             </a:fld>
             <a:endParaRPr lang="en-US" dirty="0"/>
           </a:p>
@@ -9513,388 +10887,6 @@
       <p:bldP spid="5" grpId="0"/>
     </p:bldLst>
   </p:timing>
-</p:sld>
-</file>
-
-<file path=ppt/slides/slide7.xml><?xml version="1.0" encoding="utf-8"?>
-<p:sld xmlns:a="http://schemas.openxmlformats.org/drawingml/2006/main" xmlns:r="http://schemas.openxmlformats.org/officeDocument/2006/relationships" xmlns:p="http://schemas.openxmlformats.org/presentationml/2006/main">
-  <p:cSld>
-    <p:spTree>
-      <p:nvGrpSpPr>
-        <p:cNvPr id="1" name=""/>
-        <p:cNvGrpSpPr/>
-        <p:nvPr/>
-      </p:nvGrpSpPr>
-      <p:grpSpPr>
-        <a:xfrm>
-          <a:off x="0" y="0"/>
-          <a:ext cx="0" cy="0"/>
-          <a:chOff x="0" y="0"/>
-          <a:chExt cx="0" cy="0"/>
-        </a:xfrm>
-      </p:grpSpPr>
-      <p:sp>
-        <p:nvSpPr>
-          <p:cNvPr id="2" name="Title 1">
-            <a:extLst>
-              <a:ext uri="{FF2B5EF4-FFF2-40B4-BE49-F238E27FC236}">
-                <a16:creationId xmlns:a16="http://schemas.microsoft.com/office/drawing/2014/main" id="{9D8D6E4C-FC36-3E4C-9387-96DD20072D9D}"/>
-              </a:ext>
-            </a:extLst>
-          </p:cNvPr>
-          <p:cNvSpPr>
-            <a:spLocks noGrp="1"/>
-          </p:cNvSpPr>
-          <p:nvPr>
-            <p:ph type="ctrTitle"/>
-          </p:nvPr>
-        </p:nvSpPr>
-        <p:spPr>
-          <a:xfrm>
-            <a:off x="1524000" y="914013"/>
-            <a:ext cx="9144000" cy="2387600"/>
-          </a:xfrm>
-        </p:spPr>
-        <p:txBody>
-          <a:bodyPr/>
-          <a:lstStyle/>
-          <a:p>
-            <a:r>
-              <a:rPr lang="en-US" dirty="0"/>
-              <a:t>Part II</a:t>
-            </a:r>
-          </a:p>
-        </p:txBody>
-      </p:sp>
-      <p:sp>
-        <p:nvSpPr>
-          <p:cNvPr id="3" name="Subtitle 2">
-            <a:extLst>
-              <a:ext uri="{FF2B5EF4-FFF2-40B4-BE49-F238E27FC236}">
-                <a16:creationId xmlns:a16="http://schemas.microsoft.com/office/drawing/2014/main" id="{0451A0DE-9D64-5A48-94B5-5B4E42709819}"/>
-              </a:ext>
-            </a:extLst>
-          </p:cNvPr>
-          <p:cNvSpPr>
-            <a:spLocks noGrp="1"/>
-          </p:cNvSpPr>
-          <p:nvPr>
-            <p:ph type="subTitle" idx="1"/>
-          </p:nvPr>
-        </p:nvSpPr>
-        <p:spPr>
-          <a:xfrm>
-            <a:off x="1524000" y="3393688"/>
-            <a:ext cx="9144000" cy="1655762"/>
-          </a:xfrm>
-        </p:spPr>
-        <p:txBody>
-          <a:bodyPr/>
-          <a:lstStyle/>
-          <a:p>
-            <a:r>
-              <a:rPr lang="en-US" dirty="0" err="1"/>
-              <a:t>cURL</a:t>
-            </a:r>
-            <a:r>
-              <a:rPr lang="en-US" dirty="0"/>
-              <a:t> Syntax</a:t>
-            </a:r>
-          </a:p>
-        </p:txBody>
-      </p:sp>
-    </p:spTree>
-    <p:extLst>
-      <p:ext uri="{BB962C8B-B14F-4D97-AF65-F5344CB8AC3E}">
-        <p14:creationId xmlns:p14="http://schemas.microsoft.com/office/powerpoint/2010/main" val="3846466957"/>
-      </p:ext>
-    </p:extLst>
-  </p:cSld>
-  <p:clrMapOvr>
-    <a:masterClrMapping/>
-  </p:clrMapOvr>
-  <mc:AlternateContent xmlns:mc="http://schemas.openxmlformats.org/markup-compatibility/2006" xmlns:p14="http://schemas.microsoft.com/office/powerpoint/2010/main">
-    <mc:Choice Requires="p14">
-      <p:transition spd="med" p14:dur="700">
-        <p:fade/>
-      </p:transition>
-    </mc:Choice>
-    <mc:Fallback xmlns="">
-      <p:transition spd="med">
-        <p:fade/>
-      </p:transition>
-    </mc:Fallback>
-  </mc:AlternateContent>
-</p:sld>
-</file>
-
-<file path=ppt/slides/slide8.xml><?xml version="1.0" encoding="utf-8"?>
-<p:sld xmlns:a="http://schemas.openxmlformats.org/drawingml/2006/main" xmlns:r="http://schemas.openxmlformats.org/officeDocument/2006/relationships" xmlns:p="http://schemas.openxmlformats.org/presentationml/2006/main">
-  <p:cSld>
-    <p:spTree>
-      <p:nvGrpSpPr>
-        <p:cNvPr id="1" name=""/>
-        <p:cNvGrpSpPr/>
-        <p:nvPr/>
-      </p:nvGrpSpPr>
-      <p:grpSpPr>
-        <a:xfrm>
-          <a:off x="0" y="0"/>
-          <a:ext cx="0" cy="0"/>
-          <a:chOff x="0" y="0"/>
-          <a:chExt cx="0" cy="0"/>
-        </a:xfrm>
-      </p:grpSpPr>
-      <p:sp>
-        <p:nvSpPr>
-          <p:cNvPr id="2" name="Title 1">
-            <a:extLst>
-              <a:ext uri="{FF2B5EF4-FFF2-40B4-BE49-F238E27FC236}">
-                <a16:creationId xmlns:a16="http://schemas.microsoft.com/office/drawing/2014/main" id="{EB7C4089-1746-624B-8E73-D3DAB8E88CDD}"/>
-              </a:ext>
-            </a:extLst>
-          </p:cNvPr>
-          <p:cNvSpPr>
-            <a:spLocks noGrp="1"/>
-          </p:cNvSpPr>
-          <p:nvPr>
-            <p:ph type="title"/>
-          </p:nvPr>
-        </p:nvSpPr>
-        <p:spPr/>
-        <p:txBody>
-          <a:bodyPr/>
-          <a:lstStyle/>
-          <a:p>
-            <a:r>
-              <a:rPr lang="en-US" dirty="0"/>
-              <a:t>Slide Template</a:t>
-            </a:r>
-          </a:p>
-        </p:txBody>
-      </p:sp>
-      <p:sp>
-        <p:nvSpPr>
-          <p:cNvPr id="3" name="Content Placeholder 2">
-            <a:extLst>
-              <a:ext uri="{FF2B5EF4-FFF2-40B4-BE49-F238E27FC236}">
-                <a16:creationId xmlns:a16="http://schemas.microsoft.com/office/drawing/2014/main" id="{65426B10-0364-A849-B3A4-1D0DA409155A}"/>
-              </a:ext>
-            </a:extLst>
-          </p:cNvPr>
-          <p:cNvSpPr>
-            <a:spLocks noGrp="1"/>
-          </p:cNvSpPr>
-          <p:nvPr>
-            <p:ph idx="1"/>
-          </p:nvPr>
-        </p:nvSpPr>
-        <p:spPr/>
-        <p:txBody>
-          <a:bodyPr/>
-          <a:lstStyle/>
-          <a:p>
-            <a:r>
-              <a:rPr lang="en-US" dirty="0"/>
-              <a:t>Body template</a:t>
-            </a:r>
-          </a:p>
-        </p:txBody>
-      </p:sp>
-      <p:sp>
-        <p:nvSpPr>
-          <p:cNvPr id="4" name="Date Placeholder 3">
-            <a:extLst>
-              <a:ext uri="{FF2B5EF4-FFF2-40B4-BE49-F238E27FC236}">
-                <a16:creationId xmlns:a16="http://schemas.microsoft.com/office/drawing/2014/main" id="{7ECEAF79-F4AC-E94E-9E55-220D0D396924}"/>
-              </a:ext>
-            </a:extLst>
-          </p:cNvPr>
-          <p:cNvSpPr>
-            <a:spLocks noGrp="1"/>
-          </p:cNvSpPr>
-          <p:nvPr>
-            <p:ph type="dt" sz="half" idx="10"/>
-          </p:nvPr>
-        </p:nvSpPr>
-        <p:spPr/>
-        <p:txBody>
-          <a:bodyPr/>
-          <a:lstStyle/>
-          <a:p>
-            <a:r>
-              <a:rPr lang="en-US"/>
-              <a:t>World Wide Technology ©</a:t>
-            </a:r>
-            <a:endParaRPr lang="en-US" dirty="0"/>
-          </a:p>
-        </p:txBody>
-      </p:sp>
-      <p:sp>
-        <p:nvSpPr>
-          <p:cNvPr id="5" name="Slide Number Placeholder 4">
-            <a:extLst>
-              <a:ext uri="{FF2B5EF4-FFF2-40B4-BE49-F238E27FC236}">
-                <a16:creationId xmlns:a16="http://schemas.microsoft.com/office/drawing/2014/main" id="{372DC1A4-CE8B-DB4A-8F86-2508518C35D3}"/>
-              </a:ext>
-            </a:extLst>
-          </p:cNvPr>
-          <p:cNvSpPr>
-            <a:spLocks noGrp="1"/>
-          </p:cNvSpPr>
-          <p:nvPr>
-            <p:ph type="sldNum" sz="quarter" idx="12"/>
-          </p:nvPr>
-        </p:nvSpPr>
-        <p:spPr/>
-        <p:txBody>
-          <a:bodyPr/>
-          <a:lstStyle/>
-          <a:p>
-            <a:fld id="{A44B02FA-DD2D-1844-AE35-8B2EAB0CF4EF}" type="slidenum">
-              <a:rPr lang="en-US" smtClean="0"/>
-              <a:pPr/>
-              <a:t>8</a:t>
-            </a:fld>
-            <a:endParaRPr lang="en-US" dirty="0"/>
-          </a:p>
-        </p:txBody>
-      </p:sp>
-    </p:spTree>
-    <p:extLst>
-      <p:ext uri="{BB962C8B-B14F-4D97-AF65-F5344CB8AC3E}">
-        <p14:creationId xmlns:p14="http://schemas.microsoft.com/office/powerpoint/2010/main" val="1440297303"/>
-      </p:ext>
-    </p:extLst>
-  </p:cSld>
-  <p:clrMapOvr>
-    <a:masterClrMapping/>
-  </p:clrMapOvr>
-  <mc:AlternateContent xmlns:mc="http://schemas.openxmlformats.org/markup-compatibility/2006" xmlns:p14="http://schemas.microsoft.com/office/powerpoint/2010/main">
-    <mc:Choice Requires="p14">
-      <p:transition spd="med" p14:dur="700">
-        <p:fade/>
-      </p:transition>
-    </mc:Choice>
-    <mc:Fallback xmlns="">
-      <p:transition spd="med">
-        <p:fade/>
-      </p:transition>
-    </mc:Fallback>
-  </mc:AlternateContent>
-</p:sld>
-</file>
-
-<file path=ppt/slides/slide9.xml><?xml version="1.0" encoding="utf-8"?>
-<p:sld xmlns:a="http://schemas.openxmlformats.org/drawingml/2006/main" xmlns:r="http://schemas.openxmlformats.org/officeDocument/2006/relationships" xmlns:p="http://schemas.openxmlformats.org/presentationml/2006/main">
-  <p:cSld>
-    <p:spTree>
-      <p:nvGrpSpPr>
-        <p:cNvPr id="1" name=""/>
-        <p:cNvGrpSpPr/>
-        <p:nvPr/>
-      </p:nvGrpSpPr>
-      <p:grpSpPr>
-        <a:xfrm>
-          <a:off x="0" y="0"/>
-          <a:ext cx="0" cy="0"/>
-          <a:chOff x="0" y="0"/>
-          <a:chExt cx="0" cy="0"/>
-        </a:xfrm>
-      </p:grpSpPr>
-      <p:sp>
-        <p:nvSpPr>
-          <p:cNvPr id="2" name="Title 1">
-            <a:extLst>
-              <a:ext uri="{FF2B5EF4-FFF2-40B4-BE49-F238E27FC236}">
-                <a16:creationId xmlns:a16="http://schemas.microsoft.com/office/drawing/2014/main" id="{9D8D6E4C-FC36-3E4C-9387-96DD20072D9D}"/>
-              </a:ext>
-            </a:extLst>
-          </p:cNvPr>
-          <p:cNvSpPr>
-            <a:spLocks noGrp="1"/>
-          </p:cNvSpPr>
-          <p:nvPr>
-            <p:ph type="ctrTitle"/>
-          </p:nvPr>
-        </p:nvSpPr>
-        <p:spPr>
-          <a:xfrm>
-            <a:off x="1524000" y="914013"/>
-            <a:ext cx="9144000" cy="2387600"/>
-          </a:xfrm>
-        </p:spPr>
-        <p:txBody>
-          <a:bodyPr/>
-          <a:lstStyle/>
-          <a:p>
-            <a:r>
-              <a:rPr lang="en-US" dirty="0"/>
-              <a:t>Part III</a:t>
-            </a:r>
-          </a:p>
-        </p:txBody>
-      </p:sp>
-      <p:sp>
-        <p:nvSpPr>
-          <p:cNvPr id="3" name="Subtitle 2">
-            <a:extLst>
-              <a:ext uri="{FF2B5EF4-FFF2-40B4-BE49-F238E27FC236}">
-                <a16:creationId xmlns:a16="http://schemas.microsoft.com/office/drawing/2014/main" id="{0451A0DE-9D64-5A48-94B5-5B4E42709819}"/>
-              </a:ext>
-            </a:extLst>
-          </p:cNvPr>
-          <p:cNvSpPr>
-            <a:spLocks noGrp="1"/>
-          </p:cNvSpPr>
-          <p:nvPr>
-            <p:ph type="subTitle" idx="1"/>
-          </p:nvPr>
-        </p:nvSpPr>
-        <p:spPr>
-          <a:xfrm>
-            <a:off x="1524000" y="3393688"/>
-            <a:ext cx="9144000" cy="1655762"/>
-          </a:xfrm>
-        </p:spPr>
-        <p:txBody>
-          <a:bodyPr/>
-          <a:lstStyle/>
-          <a:p>
-            <a:r>
-              <a:rPr lang="en-US" dirty="0"/>
-              <a:t>Make REST API Calls With </a:t>
-            </a:r>
-            <a:r>
-              <a:rPr lang="en-US" dirty="0" err="1"/>
-              <a:t>cURL</a:t>
-            </a:r>
-            <a:endParaRPr lang="en-US" dirty="0"/>
-          </a:p>
-        </p:txBody>
-      </p:sp>
-    </p:spTree>
-    <p:extLst>
-      <p:ext uri="{BB962C8B-B14F-4D97-AF65-F5344CB8AC3E}">
-        <p14:creationId xmlns:p14="http://schemas.microsoft.com/office/powerpoint/2010/main" val="899135878"/>
-      </p:ext>
-    </p:extLst>
-  </p:cSld>
-  <p:clrMapOvr>
-    <a:masterClrMapping/>
-  </p:clrMapOvr>
-  <mc:AlternateContent xmlns:mc="http://schemas.openxmlformats.org/markup-compatibility/2006" xmlns:p14="http://schemas.microsoft.com/office/powerpoint/2010/main">
-    <mc:Choice Requires="p14">
-      <p:transition spd="med" p14:dur="700">
-        <p:fade/>
-      </p:transition>
-    </mc:Choice>
-    <mc:Fallback xmlns="">
-      <p:transition spd="med">
-        <p:fade/>
-      </p:transition>
-    </mc:Fallback>
-  </mc:AlternateContent>
 </p:sld>
 </file>
 

</xml_diff>